<commit_message>
Final Version-pending on jeremy's addition
</commit_message>
<xml_diff>
--- a/SimPres.pptx
+++ b/SimPres.pptx
@@ -113,6 +113,11 @@
       </a:defRPr>
     </a:lvl9pPr>
   </p:defaultTextStyle>
+  <p:extLst>
+    <p:ext uri="{EFAFB233-063F-42B5-8137-9DF3F51BA10A}">
+      <p15:sldGuideLst xmlns:p15="http://schemas.microsoft.com/office/powerpoint/2012/main"/>
+    </p:ext>
+  </p:extLst>
 </p:presentation>
 </file>
 
@@ -1820,6 +1825,13 @@
         </dgm:presLayoutVars>
       </dgm:prSet>
       <dgm:spPr/>
+      <dgm:t>
+        <a:bodyPr/>
+        <a:lstStyle/>
+        <a:p>
+          <a:endParaRPr lang="en-US"/>
+        </a:p>
+      </dgm:t>
     </dgm:pt>
     <dgm:pt modelId="{B9B90E03-3638-4C04-8D08-62B26E79D572}" type="pres">
       <dgm:prSet presAssocID="{C0EB759E-EA59-4F53-8EE5-AC036CD3FD2C}" presName="root1" presStyleCnt="0"/>
@@ -1832,6 +1844,13 @@
         </dgm:presLayoutVars>
       </dgm:prSet>
       <dgm:spPr/>
+      <dgm:t>
+        <a:bodyPr/>
+        <a:lstStyle/>
+        <a:p>
+          <a:endParaRPr lang="en-US"/>
+        </a:p>
+      </dgm:t>
     </dgm:pt>
     <dgm:pt modelId="{AF8336DE-7660-4FBC-BB4D-A131C4AECAB2}" type="pres">
       <dgm:prSet presAssocID="{C0EB759E-EA59-4F53-8EE5-AC036CD3FD2C}" presName="level2hierChild" presStyleCnt="0"/>
@@ -1840,10 +1859,24 @@
     <dgm:pt modelId="{66E54A8B-1F85-44F4-BBB8-364A76B13FF8}" type="pres">
       <dgm:prSet presAssocID="{2A698805-0F54-403C-950F-A9C69FADDECF}" presName="conn2-1" presStyleLbl="parChTrans1D2" presStyleIdx="0" presStyleCnt="2"/>
       <dgm:spPr/>
+      <dgm:t>
+        <a:bodyPr/>
+        <a:lstStyle/>
+        <a:p>
+          <a:endParaRPr lang="en-US"/>
+        </a:p>
+      </dgm:t>
     </dgm:pt>
     <dgm:pt modelId="{7703D953-0AC7-405F-BFDC-943A0F67719C}" type="pres">
       <dgm:prSet presAssocID="{2A698805-0F54-403C-950F-A9C69FADDECF}" presName="connTx" presStyleLbl="parChTrans1D2" presStyleIdx="0" presStyleCnt="2"/>
       <dgm:spPr/>
+      <dgm:t>
+        <a:bodyPr/>
+        <a:lstStyle/>
+        <a:p>
+          <a:endParaRPr lang="en-US"/>
+        </a:p>
+      </dgm:t>
     </dgm:pt>
     <dgm:pt modelId="{4BF7867A-F9F4-4145-BD54-8ABA4B6CB431}" type="pres">
       <dgm:prSet presAssocID="{14B3AAE2-4255-48B2-8731-B7B2E156A9F3}" presName="root2" presStyleCnt="0"/>
@@ -1871,10 +1904,24 @@
     <dgm:pt modelId="{771A45F1-6EC3-432F-AB76-4AE0A10B21E5}" type="pres">
       <dgm:prSet presAssocID="{8C8517FA-8F88-4CF9-8EE0-D5AD389C7C82}" presName="conn2-1" presStyleLbl="parChTrans1D3" presStyleIdx="0" presStyleCnt="2"/>
       <dgm:spPr/>
+      <dgm:t>
+        <a:bodyPr/>
+        <a:lstStyle/>
+        <a:p>
+          <a:endParaRPr lang="en-US"/>
+        </a:p>
+      </dgm:t>
     </dgm:pt>
     <dgm:pt modelId="{7F7D6193-A0A6-4DEB-B565-22B0AE67A8A9}" type="pres">
       <dgm:prSet presAssocID="{8C8517FA-8F88-4CF9-8EE0-D5AD389C7C82}" presName="connTx" presStyleLbl="parChTrans1D3" presStyleIdx="0" presStyleCnt="2"/>
       <dgm:spPr/>
+      <dgm:t>
+        <a:bodyPr/>
+        <a:lstStyle/>
+        <a:p>
+          <a:endParaRPr lang="en-US"/>
+        </a:p>
+      </dgm:t>
     </dgm:pt>
     <dgm:pt modelId="{B7293EBD-AE9A-4972-8CF4-8C19645089A9}" type="pres">
       <dgm:prSet presAssocID="{E4F73A1C-F735-4744-9718-C33933CFA8DD}" presName="root2" presStyleCnt="0"/>
@@ -1902,10 +1949,24 @@
     <dgm:pt modelId="{C0E7AD36-99BF-42ED-86A6-86CE0D6C6FC3}" type="pres">
       <dgm:prSet presAssocID="{6E2417EB-8E6C-4158-AE3A-560813DBCA16}" presName="conn2-1" presStyleLbl="parChTrans1D2" presStyleIdx="1" presStyleCnt="2"/>
       <dgm:spPr/>
+      <dgm:t>
+        <a:bodyPr/>
+        <a:lstStyle/>
+        <a:p>
+          <a:endParaRPr lang="en-US"/>
+        </a:p>
+      </dgm:t>
     </dgm:pt>
     <dgm:pt modelId="{BA226942-1BD7-46FE-8952-A3C5E65D032A}" type="pres">
       <dgm:prSet presAssocID="{6E2417EB-8E6C-4158-AE3A-560813DBCA16}" presName="connTx" presStyleLbl="parChTrans1D2" presStyleIdx="1" presStyleCnt="2"/>
       <dgm:spPr/>
+      <dgm:t>
+        <a:bodyPr/>
+        <a:lstStyle/>
+        <a:p>
+          <a:endParaRPr lang="en-US"/>
+        </a:p>
+      </dgm:t>
     </dgm:pt>
     <dgm:pt modelId="{13BE1883-50F2-4A1D-ABDD-C28CB9300583}" type="pres">
       <dgm:prSet presAssocID="{6F450E12-FD72-4AFA-8230-574E45573605}" presName="root2" presStyleCnt="0"/>
@@ -1918,6 +1979,13 @@
         </dgm:presLayoutVars>
       </dgm:prSet>
       <dgm:spPr/>
+      <dgm:t>
+        <a:bodyPr/>
+        <a:lstStyle/>
+        <a:p>
+          <a:endParaRPr lang="en-US"/>
+        </a:p>
+      </dgm:t>
     </dgm:pt>
     <dgm:pt modelId="{C6AAF149-9E05-4B59-B63B-E16888536B93}" type="pres">
       <dgm:prSet presAssocID="{6F450E12-FD72-4AFA-8230-574E45573605}" presName="level3hierChild" presStyleCnt="0"/>
@@ -1926,10 +1994,24 @@
     <dgm:pt modelId="{6C804501-E557-4DB6-A979-AC399BDCBBED}" type="pres">
       <dgm:prSet presAssocID="{F3D94EA6-80A6-46E3-A61D-96AC20288E9D}" presName="conn2-1" presStyleLbl="parChTrans1D3" presStyleIdx="1" presStyleCnt="2"/>
       <dgm:spPr/>
+      <dgm:t>
+        <a:bodyPr/>
+        <a:lstStyle/>
+        <a:p>
+          <a:endParaRPr lang="en-US"/>
+        </a:p>
+      </dgm:t>
     </dgm:pt>
     <dgm:pt modelId="{41957517-3461-4BC9-BEC2-6FCE55D43017}" type="pres">
       <dgm:prSet presAssocID="{F3D94EA6-80A6-46E3-A61D-96AC20288E9D}" presName="connTx" presStyleLbl="parChTrans1D3" presStyleIdx="1" presStyleCnt="2"/>
       <dgm:spPr/>
+      <dgm:t>
+        <a:bodyPr/>
+        <a:lstStyle/>
+        <a:p>
+          <a:endParaRPr lang="en-US"/>
+        </a:p>
+      </dgm:t>
     </dgm:pt>
     <dgm:pt modelId="{246FE32B-2180-4C6F-83BE-73585161C0D3}" type="pres">
       <dgm:prSet presAssocID="{F8E6D1AA-CF69-4934-89CA-3857D54E0F00}" presName="root2" presStyleCnt="0"/>
@@ -1942,6 +2024,13 @@
         </dgm:presLayoutVars>
       </dgm:prSet>
       <dgm:spPr/>
+      <dgm:t>
+        <a:bodyPr/>
+        <a:lstStyle/>
+        <a:p>
+          <a:endParaRPr lang="en-US"/>
+        </a:p>
+      </dgm:t>
     </dgm:pt>
     <dgm:pt modelId="{351C175F-D689-4995-B4F6-52A200AA0F5F}" type="pres">
       <dgm:prSet presAssocID="{F8E6D1AA-CF69-4934-89CA-3857D54E0F00}" presName="level3hierChild" presStyleCnt="0"/>
@@ -2175,6 +2264,13 @@
         </dgm:presLayoutVars>
       </dgm:prSet>
       <dgm:spPr/>
+      <dgm:t>
+        <a:bodyPr/>
+        <a:lstStyle/>
+        <a:p>
+          <a:endParaRPr lang="en-US"/>
+        </a:p>
+      </dgm:t>
     </dgm:pt>
     <dgm:pt modelId="{B9B90E03-3638-4C04-8D08-62B26E79D572}" type="pres">
       <dgm:prSet presAssocID="{C0EB759E-EA59-4F53-8EE5-AC036CD3FD2C}" presName="root1" presStyleCnt="0"/>
@@ -2202,10 +2298,24 @@
     <dgm:pt modelId="{4AE31128-CCE2-4C5E-B14B-AC2FB1931328}" type="pres">
       <dgm:prSet presAssocID="{4510D699-80E6-4FD2-B2A1-F1ECBFC4870D}" presName="conn2-1" presStyleLbl="parChTrans1D2" presStyleIdx="0" presStyleCnt="1"/>
       <dgm:spPr/>
+      <dgm:t>
+        <a:bodyPr/>
+        <a:lstStyle/>
+        <a:p>
+          <a:endParaRPr lang="en-US"/>
+        </a:p>
+      </dgm:t>
     </dgm:pt>
     <dgm:pt modelId="{11BCAB07-AEC9-4BE4-AA95-0A91DB41C119}" type="pres">
       <dgm:prSet presAssocID="{4510D699-80E6-4FD2-B2A1-F1ECBFC4870D}" presName="connTx" presStyleLbl="parChTrans1D2" presStyleIdx="0" presStyleCnt="1"/>
       <dgm:spPr/>
+      <dgm:t>
+        <a:bodyPr/>
+        <a:lstStyle/>
+        <a:p>
+          <a:endParaRPr lang="en-US"/>
+        </a:p>
+      </dgm:t>
     </dgm:pt>
     <dgm:pt modelId="{0CF08065-BDF2-4D2F-BEF6-988920A02241}" type="pres">
       <dgm:prSet presAssocID="{F84DF3E8-7012-4A4F-B312-BB45005DA22E}" presName="root2" presStyleCnt="0"/>
@@ -2233,10 +2343,24 @@
     <dgm:pt modelId="{4BD4F569-46C1-4784-801F-B7FD4D73E76C}" type="pres">
       <dgm:prSet presAssocID="{8115EDEB-1E2A-4FBB-850A-CAAC5880991F}" presName="conn2-1" presStyleLbl="parChTrans1D3" presStyleIdx="0" presStyleCnt="1"/>
       <dgm:spPr/>
+      <dgm:t>
+        <a:bodyPr/>
+        <a:lstStyle/>
+        <a:p>
+          <a:endParaRPr lang="en-US"/>
+        </a:p>
+      </dgm:t>
     </dgm:pt>
     <dgm:pt modelId="{7EAF933E-7F86-4924-8D8D-C5765357150A}" type="pres">
       <dgm:prSet presAssocID="{8115EDEB-1E2A-4FBB-850A-CAAC5880991F}" presName="connTx" presStyleLbl="parChTrans1D3" presStyleIdx="0" presStyleCnt="1"/>
       <dgm:spPr/>
+      <dgm:t>
+        <a:bodyPr/>
+        <a:lstStyle/>
+        <a:p>
+          <a:endParaRPr lang="en-US"/>
+        </a:p>
+      </dgm:t>
     </dgm:pt>
     <dgm:pt modelId="{93C97E17-04AB-4AEE-B2DD-7BE15A7E3F91}" type="pres">
       <dgm:prSet presAssocID="{0BE3D3AA-7ABD-4D2F-B1C5-A4F3337988D8}" presName="root2" presStyleCnt="0"/>
@@ -2264,10 +2388,24 @@
     <dgm:pt modelId="{EC54C2B9-1130-4F49-94FC-D9785D69014C}" type="pres">
       <dgm:prSet presAssocID="{90F99052-2882-4D50-A06B-B612F43DD21A}" presName="conn2-1" presStyleLbl="parChTrans1D4" presStyleIdx="0" presStyleCnt="1"/>
       <dgm:spPr/>
+      <dgm:t>
+        <a:bodyPr/>
+        <a:lstStyle/>
+        <a:p>
+          <a:endParaRPr lang="en-US"/>
+        </a:p>
+      </dgm:t>
     </dgm:pt>
     <dgm:pt modelId="{5BD9C4AD-031C-48F9-9789-71A8E9BBC3A3}" type="pres">
       <dgm:prSet presAssocID="{90F99052-2882-4D50-A06B-B612F43DD21A}" presName="connTx" presStyleLbl="parChTrans1D4" presStyleIdx="0" presStyleCnt="1"/>
       <dgm:spPr/>
+      <dgm:t>
+        <a:bodyPr/>
+        <a:lstStyle/>
+        <a:p>
+          <a:endParaRPr lang="en-US"/>
+        </a:p>
+      </dgm:t>
     </dgm:pt>
     <dgm:pt modelId="{88137E2D-9AD2-487A-8B11-E02171BA175F}" type="pres">
       <dgm:prSet presAssocID="{5C3DA735-4680-4516-B479-7065B11973EF}" presName="root2" presStyleCnt="0"/>
@@ -2294,21 +2432,21 @@
     </dgm:pt>
   </dgm:ptLst>
   <dgm:cxnLst>
+    <dgm:cxn modelId="{2E5E9270-B489-4583-AD41-05125018C1D0}" type="presOf" srcId="{4510D699-80E6-4FD2-B2A1-F1ECBFC4870D}" destId="{11BCAB07-AEC9-4BE4-AA95-0A91DB41C119}" srcOrd="1" destOrd="0" presId="urn:microsoft.com/office/officeart/2005/8/layout/hierarchy2"/>
+    <dgm:cxn modelId="{C4234A72-B1D2-4768-95F6-795270488F10}" srcId="{F84DF3E8-7012-4A4F-B312-BB45005DA22E}" destId="{0BE3D3AA-7ABD-4D2F-B1C5-A4F3337988D8}" srcOrd="0" destOrd="0" parTransId="{8115EDEB-1E2A-4FBB-850A-CAAC5880991F}" sibTransId="{ED35EB4E-839C-4906-B01E-2DB265F6A650}"/>
+    <dgm:cxn modelId="{FCB15A72-B4DF-4C76-9BE2-7DF643781A66}" type="presOf" srcId="{F84DF3E8-7012-4A4F-B312-BB45005DA22E}" destId="{40B2B726-955D-4E64-BEF3-E46FA7084B65}" srcOrd="0" destOrd="0" presId="urn:microsoft.com/office/officeart/2005/8/layout/hierarchy2"/>
+    <dgm:cxn modelId="{11DBF2B3-345C-4224-9F6F-D854977FCD9D}" type="presOf" srcId="{90F99052-2882-4D50-A06B-B612F43DD21A}" destId="{5BD9C4AD-031C-48F9-9789-71A8E9BBC3A3}" srcOrd="1" destOrd="0" presId="urn:microsoft.com/office/officeart/2005/8/layout/hierarchy2"/>
+    <dgm:cxn modelId="{4D7BB81A-47AE-40E1-A294-82A55C4C7E4C}" type="presOf" srcId="{8115EDEB-1E2A-4FBB-850A-CAAC5880991F}" destId="{7EAF933E-7F86-4924-8D8D-C5765357150A}" srcOrd="1" destOrd="0" presId="urn:microsoft.com/office/officeart/2005/8/layout/hierarchy2"/>
     <dgm:cxn modelId="{7BD06E7B-1EEB-4C4B-8BD7-3CA86126E4D7}" type="presOf" srcId="{C0EB759E-EA59-4F53-8EE5-AC036CD3FD2C}" destId="{E75857F3-4947-4919-971C-E51FDD5F1924}" srcOrd="0" destOrd="0" presId="urn:microsoft.com/office/officeart/2005/8/layout/hierarchy2"/>
-    <dgm:cxn modelId="{FCB15A72-B4DF-4C76-9BE2-7DF643781A66}" type="presOf" srcId="{F84DF3E8-7012-4A4F-B312-BB45005DA22E}" destId="{40B2B726-955D-4E64-BEF3-E46FA7084B65}" srcOrd="0" destOrd="0" presId="urn:microsoft.com/office/officeart/2005/8/layout/hierarchy2"/>
+    <dgm:cxn modelId="{71BF918C-46D5-4519-B10B-7905ABE880E6}" srcId="{C0EB759E-EA59-4F53-8EE5-AC036CD3FD2C}" destId="{F84DF3E8-7012-4A4F-B312-BB45005DA22E}" srcOrd="0" destOrd="0" parTransId="{4510D699-80E6-4FD2-B2A1-F1ECBFC4870D}" sibTransId="{FDACC822-0F1F-42C5-8B7F-0D28394C5C61}"/>
+    <dgm:cxn modelId="{1B072B9E-91FA-4D69-9758-2F23902DA3A7}" type="presOf" srcId="{5C3DA735-4680-4516-B479-7065B11973EF}" destId="{1C6F0FB2-107F-4E80-B0C6-7D85D179FEB7}" srcOrd="0" destOrd="0" presId="urn:microsoft.com/office/officeart/2005/8/layout/hierarchy2"/>
+    <dgm:cxn modelId="{C89AAB33-F0A7-4A8C-98B5-40DD0DE889E8}" srcId="{0BE3D3AA-7ABD-4D2F-B1C5-A4F3337988D8}" destId="{5C3DA735-4680-4516-B479-7065B11973EF}" srcOrd="0" destOrd="0" parTransId="{90F99052-2882-4D50-A06B-B612F43DD21A}" sibTransId="{7FF82BF8-84F6-4E51-829A-E1B13CC5F0F6}"/>
+    <dgm:cxn modelId="{43AA36C9-3A28-4EE2-9720-D8B9ECB72EB7}" type="presOf" srcId="{4510D699-80E6-4FD2-B2A1-F1ECBFC4870D}" destId="{4AE31128-CCE2-4C5E-B14B-AC2FB1931328}" srcOrd="0" destOrd="0" presId="urn:microsoft.com/office/officeart/2005/8/layout/hierarchy2"/>
+    <dgm:cxn modelId="{8C35F9B5-36E4-4AFE-A396-B9FE11B5C8EF}" type="presOf" srcId="{0BE3D3AA-7ABD-4D2F-B1C5-A4F3337988D8}" destId="{17A60922-042F-4C03-B020-54BF33068DF3}" srcOrd="0" destOrd="0" presId="urn:microsoft.com/office/officeart/2005/8/layout/hierarchy2"/>
+    <dgm:cxn modelId="{5253F879-A5D8-4190-A2D5-DDC2E07B9F00}" type="presOf" srcId="{8115EDEB-1E2A-4FBB-850A-CAAC5880991F}" destId="{4BD4F569-46C1-4784-801F-B7FD4D73E76C}" srcOrd="0" destOrd="0" presId="urn:microsoft.com/office/officeart/2005/8/layout/hierarchy2"/>
+    <dgm:cxn modelId="{C9B8504F-43E8-4B54-9515-3CFCB917F2D8}" type="presOf" srcId="{90F99052-2882-4D50-A06B-B612F43DD21A}" destId="{EC54C2B9-1130-4F49-94FC-D9785D69014C}" srcOrd="0" destOrd="0" presId="urn:microsoft.com/office/officeart/2005/8/layout/hierarchy2"/>
     <dgm:cxn modelId="{B69D5503-B63F-46DC-8C65-46DF6B619DA2}" type="presOf" srcId="{6EBA0EB6-ED05-4364-A028-668470074693}" destId="{4956C07B-930B-4940-99BF-0D3103EFC0BB}" srcOrd="0" destOrd="0" presId="urn:microsoft.com/office/officeart/2005/8/layout/hierarchy2"/>
-    <dgm:cxn modelId="{11DBF2B3-345C-4224-9F6F-D854977FCD9D}" type="presOf" srcId="{90F99052-2882-4D50-A06B-B612F43DD21A}" destId="{5BD9C4AD-031C-48F9-9789-71A8E9BBC3A3}" srcOrd="1" destOrd="0" presId="urn:microsoft.com/office/officeart/2005/8/layout/hierarchy2"/>
-    <dgm:cxn modelId="{43AA36C9-3A28-4EE2-9720-D8B9ECB72EB7}" type="presOf" srcId="{4510D699-80E6-4FD2-B2A1-F1ECBFC4870D}" destId="{4AE31128-CCE2-4C5E-B14B-AC2FB1931328}" srcOrd="0" destOrd="0" presId="urn:microsoft.com/office/officeart/2005/8/layout/hierarchy2"/>
-    <dgm:cxn modelId="{4D7BB81A-47AE-40E1-A294-82A55C4C7E4C}" type="presOf" srcId="{8115EDEB-1E2A-4FBB-850A-CAAC5880991F}" destId="{7EAF933E-7F86-4924-8D8D-C5765357150A}" srcOrd="1" destOrd="0" presId="urn:microsoft.com/office/officeart/2005/8/layout/hierarchy2"/>
-    <dgm:cxn modelId="{C9B8504F-43E8-4B54-9515-3CFCB917F2D8}" type="presOf" srcId="{90F99052-2882-4D50-A06B-B612F43DD21A}" destId="{EC54C2B9-1130-4F49-94FC-D9785D69014C}" srcOrd="0" destOrd="0" presId="urn:microsoft.com/office/officeart/2005/8/layout/hierarchy2"/>
-    <dgm:cxn modelId="{C4234A72-B1D2-4768-95F6-795270488F10}" srcId="{F84DF3E8-7012-4A4F-B312-BB45005DA22E}" destId="{0BE3D3AA-7ABD-4D2F-B1C5-A4F3337988D8}" srcOrd="0" destOrd="0" parTransId="{8115EDEB-1E2A-4FBB-850A-CAAC5880991F}" sibTransId="{ED35EB4E-839C-4906-B01E-2DB265F6A650}"/>
-    <dgm:cxn modelId="{1B072B9E-91FA-4D69-9758-2F23902DA3A7}" type="presOf" srcId="{5C3DA735-4680-4516-B479-7065B11973EF}" destId="{1C6F0FB2-107F-4E80-B0C6-7D85D179FEB7}" srcOrd="0" destOrd="0" presId="urn:microsoft.com/office/officeart/2005/8/layout/hierarchy2"/>
-    <dgm:cxn modelId="{2E5E9270-B489-4583-AD41-05125018C1D0}" type="presOf" srcId="{4510D699-80E6-4FD2-B2A1-F1ECBFC4870D}" destId="{11BCAB07-AEC9-4BE4-AA95-0A91DB41C119}" srcOrd="1" destOrd="0" presId="urn:microsoft.com/office/officeart/2005/8/layout/hierarchy2"/>
-    <dgm:cxn modelId="{C89AAB33-F0A7-4A8C-98B5-40DD0DE889E8}" srcId="{0BE3D3AA-7ABD-4D2F-B1C5-A4F3337988D8}" destId="{5C3DA735-4680-4516-B479-7065B11973EF}" srcOrd="0" destOrd="0" parTransId="{90F99052-2882-4D50-A06B-B612F43DD21A}" sibTransId="{7FF82BF8-84F6-4E51-829A-E1B13CC5F0F6}"/>
-    <dgm:cxn modelId="{5253F879-A5D8-4190-A2D5-DDC2E07B9F00}" type="presOf" srcId="{8115EDEB-1E2A-4FBB-850A-CAAC5880991F}" destId="{4BD4F569-46C1-4784-801F-B7FD4D73E76C}" srcOrd="0" destOrd="0" presId="urn:microsoft.com/office/officeart/2005/8/layout/hierarchy2"/>
-    <dgm:cxn modelId="{71BF918C-46D5-4519-B10B-7905ABE880E6}" srcId="{C0EB759E-EA59-4F53-8EE5-AC036CD3FD2C}" destId="{F84DF3E8-7012-4A4F-B312-BB45005DA22E}" srcOrd="0" destOrd="0" parTransId="{4510D699-80E6-4FD2-B2A1-F1ECBFC4870D}" sibTransId="{FDACC822-0F1F-42C5-8B7F-0D28394C5C61}"/>
     <dgm:cxn modelId="{D2F63CD3-741C-4AB7-8B6F-C47D09B5E1D3}" srcId="{6EBA0EB6-ED05-4364-A028-668470074693}" destId="{C0EB759E-EA59-4F53-8EE5-AC036CD3FD2C}" srcOrd="0" destOrd="0" parTransId="{F31908B7-9A87-4184-BF00-24B7317FB1CC}" sibTransId="{C9571CC0-E760-487E-9BEB-44656107087C}"/>
-    <dgm:cxn modelId="{8C35F9B5-36E4-4AFE-A396-B9FE11B5C8EF}" type="presOf" srcId="{0BE3D3AA-7ABD-4D2F-B1C5-A4F3337988D8}" destId="{17A60922-042F-4C03-B020-54BF33068DF3}" srcOrd="0" destOrd="0" presId="urn:microsoft.com/office/officeart/2005/8/layout/hierarchy2"/>
     <dgm:cxn modelId="{8717B72B-3B39-4216-B5AE-91F98B2482F0}" type="presParOf" srcId="{4956C07B-930B-4940-99BF-0D3103EFC0BB}" destId="{B9B90E03-3638-4C04-8D08-62B26E79D572}" srcOrd="0" destOrd="0" presId="urn:microsoft.com/office/officeart/2005/8/layout/hierarchy2"/>
     <dgm:cxn modelId="{56C30316-FC63-44BA-8FAA-E8527120B29F}" type="presParOf" srcId="{B9B90E03-3638-4C04-8D08-62B26E79D572}" destId="{E75857F3-4947-4919-971C-E51FDD5F1924}" srcOrd="0" destOrd="0" presId="urn:microsoft.com/office/officeart/2005/8/layout/hierarchy2"/>
     <dgm:cxn modelId="{36025173-72B4-4FCE-BE9F-A5F35596D6D3}" type="presParOf" srcId="{B9B90E03-3638-4C04-8D08-62B26E79D572}" destId="{AF8336DE-7660-4FBC-BB4D-A131C4AECAB2}" srcOrd="1" destOrd="0" presId="urn:microsoft.com/office/officeart/2005/8/layout/hierarchy2"/>
@@ -2346,717 +2484,6 @@
       <dsp:cNvGrpSpPr/>
     </dsp:nvGrpSpPr>
     <dsp:grpSpPr/>
-    <dsp:sp modelId="{E75857F3-4947-4919-971C-E51FDD5F1924}">
-      <dsp:nvSpPr>
-        <dsp:cNvPr id="0" name=""/>
-        <dsp:cNvSpPr/>
-      </dsp:nvSpPr>
-      <dsp:spPr>
-        <a:xfrm>
-          <a:off x="2427" y="690317"/>
-          <a:ext cx="2261003" cy="1130501"/>
-        </a:xfrm>
-        <a:prstGeom prst="roundRect">
-          <a:avLst>
-            <a:gd name="adj" fmla="val 10000"/>
-          </a:avLst>
-        </a:prstGeom>
-        <a:solidFill>
-          <a:schemeClr val="accent1">
-            <a:hueOff val="0"/>
-            <a:satOff val="0"/>
-            <a:lumOff val="0"/>
-            <a:alphaOff val="0"/>
-          </a:schemeClr>
-        </a:solidFill>
-        <a:ln w="19050" cap="rnd" cmpd="sng" algn="ctr">
-          <a:solidFill>
-            <a:schemeClr val="lt1">
-              <a:hueOff val="0"/>
-              <a:satOff val="0"/>
-              <a:lumOff val="0"/>
-              <a:alphaOff val="0"/>
-            </a:schemeClr>
-          </a:solidFill>
-          <a:prstDash val="solid"/>
-        </a:ln>
-        <a:effectLst/>
-      </dsp:spPr>
-      <dsp:style>
-        <a:lnRef idx="2">
-          <a:scrgbClr r="0" g="0" b="0"/>
-        </a:lnRef>
-        <a:fillRef idx="1">
-          <a:scrgbClr r="0" g="0" b="0"/>
-        </a:fillRef>
-        <a:effectRef idx="0">
-          <a:scrgbClr r="0" g="0" b="0"/>
-        </a:effectRef>
-        <a:fontRef idx="minor">
-          <a:schemeClr val="lt1"/>
-        </a:fontRef>
-      </dsp:style>
-      <dsp:txBody>
-        <a:bodyPr spcFirstLastPara="0" vert="horz" wrap="square" lIns="24130" tIns="24130" rIns="24130" bIns="24130" numCol="1" spcCol="1270" anchor="ctr" anchorCtr="0">
-          <a:noAutofit/>
-        </a:bodyPr>
-        <a:lstStyle/>
-        <a:p>
-          <a:pPr lvl="0" algn="ctr" defTabSz="1689100">
-            <a:lnSpc>
-              <a:spcPct val="90000"/>
-            </a:lnSpc>
-            <a:spcBef>
-              <a:spcPct val="0"/>
-            </a:spcBef>
-            <a:spcAft>
-              <a:spcPct val="35000"/>
-            </a:spcAft>
-          </a:pPr>
-          <a:r>
-            <a:rPr lang="en-US" sz="3800" kern="1200" dirty="0" smtClean="0"/>
-            <a:t>Arrivals</a:t>
-          </a:r>
-          <a:endParaRPr lang="en-US" sz="3800" kern="1200" dirty="0"/>
-        </a:p>
-      </dsp:txBody>
-      <dsp:txXfrm>
-        <a:off x="35538" y="723428"/>
-        <a:ext cx="2194781" cy="1064279"/>
-      </dsp:txXfrm>
-    </dsp:sp>
-    <dsp:sp modelId="{66E54A8B-1F85-44F4-BBB8-364A76B13FF8}">
-      <dsp:nvSpPr>
-        <dsp:cNvPr id="0" name=""/>
-        <dsp:cNvSpPr/>
-      </dsp:nvSpPr>
-      <dsp:spPr>
-        <a:xfrm rot="19457599">
-          <a:off x="2158744" y="890031"/>
-          <a:ext cx="1113773" cy="81035"/>
-        </a:xfrm>
-        <a:custGeom>
-          <a:avLst/>
-          <a:gdLst/>
-          <a:ahLst/>
-          <a:cxnLst/>
-          <a:rect l="0" t="0" r="0" b="0"/>
-          <a:pathLst>
-            <a:path>
-              <a:moveTo>
-                <a:pt x="0" y="40517"/>
-              </a:moveTo>
-              <a:lnTo>
-                <a:pt x="1113773" y="40517"/>
-              </a:lnTo>
-            </a:path>
-          </a:pathLst>
-        </a:custGeom>
-        <a:noFill/>
-        <a:ln w="19050" cap="rnd" cmpd="sng" algn="ctr">
-          <a:solidFill>
-            <a:schemeClr val="accent1">
-              <a:shade val="60000"/>
-              <a:hueOff val="0"/>
-              <a:satOff val="0"/>
-              <a:lumOff val="0"/>
-              <a:alphaOff val="0"/>
-            </a:schemeClr>
-          </a:solidFill>
-          <a:prstDash val="solid"/>
-        </a:ln>
-        <a:effectLst/>
-      </dsp:spPr>
-      <dsp:style>
-        <a:lnRef idx="2">
-          <a:scrgbClr r="0" g="0" b="0"/>
-        </a:lnRef>
-        <a:fillRef idx="0">
-          <a:scrgbClr r="0" g="0" b="0"/>
-        </a:fillRef>
-        <a:effectRef idx="0">
-          <a:scrgbClr r="0" g="0" b="0"/>
-        </a:effectRef>
-        <a:fontRef idx="minor"/>
-      </dsp:style>
-      <dsp:txBody>
-        <a:bodyPr spcFirstLastPara="0" vert="horz" wrap="square" lIns="12700" tIns="0" rIns="12700" bIns="0" numCol="1" spcCol="1270" anchor="ctr" anchorCtr="0">
-          <a:noAutofit/>
-        </a:bodyPr>
-        <a:lstStyle/>
-        <a:p>
-          <a:pPr lvl="0" algn="ctr" defTabSz="222250">
-            <a:lnSpc>
-              <a:spcPct val="90000"/>
-            </a:lnSpc>
-            <a:spcBef>
-              <a:spcPct val="0"/>
-            </a:spcBef>
-            <a:spcAft>
-              <a:spcPct val="35000"/>
-            </a:spcAft>
-          </a:pPr>
-          <a:endParaRPr lang="en-US" sz="500" kern="1200"/>
-        </a:p>
-      </dsp:txBody>
-      <dsp:txXfrm>
-        <a:off x="2687787" y="902704"/>
-        <a:ext cx="55688" cy="55688"/>
-      </dsp:txXfrm>
-    </dsp:sp>
-    <dsp:sp modelId="{87C7D4D0-FC0F-4C1D-836A-CE59F03CB85E}">
-      <dsp:nvSpPr>
-        <dsp:cNvPr id="0" name=""/>
-        <dsp:cNvSpPr/>
-      </dsp:nvSpPr>
-      <dsp:spPr>
-        <a:xfrm>
-          <a:off x="3167832" y="40278"/>
-          <a:ext cx="2261003" cy="1130501"/>
-        </a:xfrm>
-        <a:prstGeom prst="roundRect">
-          <a:avLst>
-            <a:gd name="adj" fmla="val 10000"/>
-          </a:avLst>
-        </a:prstGeom>
-        <a:solidFill>
-          <a:schemeClr val="accent1">
-            <a:hueOff val="0"/>
-            <a:satOff val="0"/>
-            <a:lumOff val="0"/>
-            <a:alphaOff val="0"/>
-          </a:schemeClr>
-        </a:solidFill>
-        <a:ln w="19050" cap="rnd" cmpd="sng" algn="ctr">
-          <a:solidFill>
-            <a:schemeClr val="lt1">
-              <a:hueOff val="0"/>
-              <a:satOff val="0"/>
-              <a:lumOff val="0"/>
-              <a:alphaOff val="0"/>
-            </a:schemeClr>
-          </a:solidFill>
-          <a:prstDash val="solid"/>
-        </a:ln>
-        <a:effectLst/>
-      </dsp:spPr>
-      <dsp:style>
-        <a:lnRef idx="2">
-          <a:scrgbClr r="0" g="0" b="0"/>
-        </a:lnRef>
-        <a:fillRef idx="1">
-          <a:scrgbClr r="0" g="0" b="0"/>
-        </a:fillRef>
-        <a:effectRef idx="0">
-          <a:scrgbClr r="0" g="0" b="0"/>
-        </a:effectRef>
-        <a:fontRef idx="minor">
-          <a:schemeClr val="lt1"/>
-        </a:fontRef>
-      </dsp:style>
-      <dsp:txBody>
-        <a:bodyPr spcFirstLastPara="0" vert="horz" wrap="square" lIns="24130" tIns="24130" rIns="24130" bIns="24130" numCol="1" spcCol="1270" anchor="ctr" anchorCtr="0">
-          <a:noAutofit/>
-        </a:bodyPr>
-        <a:lstStyle/>
-        <a:p>
-          <a:pPr lvl="0" algn="ctr" defTabSz="1689100">
-            <a:lnSpc>
-              <a:spcPct val="90000"/>
-            </a:lnSpc>
-            <a:spcBef>
-              <a:spcPct val="0"/>
-            </a:spcBef>
-            <a:spcAft>
-              <a:spcPct val="35000"/>
-            </a:spcAft>
-          </a:pPr>
-          <a:r>
-            <a:rPr lang="en-US" sz="3800" kern="1200" dirty="0" smtClean="0"/>
-            <a:t>Market To-Go</a:t>
-          </a:r>
-          <a:endParaRPr lang="en-US" sz="3800" kern="1200" dirty="0"/>
-        </a:p>
-      </dsp:txBody>
-      <dsp:txXfrm>
-        <a:off x="3200943" y="73389"/>
-        <a:ext cx="2194781" cy="1064279"/>
-      </dsp:txXfrm>
-    </dsp:sp>
-    <dsp:sp modelId="{771A45F1-6EC3-432F-AB76-4AE0A10B21E5}">
-      <dsp:nvSpPr>
-        <dsp:cNvPr id="0" name=""/>
-        <dsp:cNvSpPr/>
-      </dsp:nvSpPr>
-      <dsp:spPr>
-        <a:xfrm>
-          <a:off x="5428835" y="565011"/>
-          <a:ext cx="904401" cy="81035"/>
-        </a:xfrm>
-        <a:custGeom>
-          <a:avLst/>
-          <a:gdLst/>
-          <a:ahLst/>
-          <a:cxnLst/>
-          <a:rect l="0" t="0" r="0" b="0"/>
-          <a:pathLst>
-            <a:path>
-              <a:moveTo>
-                <a:pt x="0" y="40517"/>
-              </a:moveTo>
-              <a:lnTo>
-                <a:pt x="904401" y="40517"/>
-              </a:lnTo>
-            </a:path>
-          </a:pathLst>
-        </a:custGeom>
-        <a:noFill/>
-        <a:ln w="19050" cap="rnd" cmpd="sng" algn="ctr">
-          <a:solidFill>
-            <a:schemeClr val="accent1">
-              <a:shade val="80000"/>
-              <a:hueOff val="0"/>
-              <a:satOff val="0"/>
-              <a:lumOff val="0"/>
-              <a:alphaOff val="0"/>
-            </a:schemeClr>
-          </a:solidFill>
-          <a:prstDash val="solid"/>
-        </a:ln>
-        <a:effectLst/>
-      </dsp:spPr>
-      <dsp:style>
-        <a:lnRef idx="2">
-          <a:scrgbClr r="0" g="0" b="0"/>
-        </a:lnRef>
-        <a:fillRef idx="0">
-          <a:scrgbClr r="0" g="0" b="0"/>
-        </a:fillRef>
-        <a:effectRef idx="0">
-          <a:scrgbClr r="0" g="0" b="0"/>
-        </a:effectRef>
-        <a:fontRef idx="minor"/>
-      </dsp:style>
-      <dsp:txBody>
-        <a:bodyPr spcFirstLastPara="0" vert="horz" wrap="square" lIns="12700" tIns="0" rIns="12700" bIns="0" numCol="1" spcCol="1270" anchor="ctr" anchorCtr="0">
-          <a:noAutofit/>
-        </a:bodyPr>
-        <a:lstStyle/>
-        <a:p>
-          <a:pPr lvl="0" algn="ctr" defTabSz="222250">
-            <a:lnSpc>
-              <a:spcPct val="90000"/>
-            </a:lnSpc>
-            <a:spcBef>
-              <a:spcPct val="0"/>
-            </a:spcBef>
-            <a:spcAft>
-              <a:spcPct val="35000"/>
-            </a:spcAft>
-          </a:pPr>
-          <a:endParaRPr lang="en-US" sz="500" kern="1200"/>
-        </a:p>
-      </dsp:txBody>
-      <dsp:txXfrm>
-        <a:off x="5858426" y="582919"/>
-        <a:ext cx="45220" cy="45220"/>
-      </dsp:txXfrm>
-    </dsp:sp>
-    <dsp:sp modelId="{8328A7F7-84F2-4D75-9080-6A957664729A}">
-      <dsp:nvSpPr>
-        <dsp:cNvPr id="0" name=""/>
-        <dsp:cNvSpPr/>
-      </dsp:nvSpPr>
-      <dsp:spPr>
-        <a:xfrm>
-          <a:off x="6333236" y="40278"/>
-          <a:ext cx="2261003" cy="1130501"/>
-        </a:xfrm>
-        <a:prstGeom prst="roundRect">
-          <a:avLst>
-            <a:gd name="adj" fmla="val 10000"/>
-          </a:avLst>
-        </a:prstGeom>
-        <a:solidFill>
-          <a:schemeClr val="accent1">
-            <a:hueOff val="0"/>
-            <a:satOff val="0"/>
-            <a:lumOff val="0"/>
-            <a:alphaOff val="0"/>
-          </a:schemeClr>
-        </a:solidFill>
-        <a:ln w="19050" cap="rnd" cmpd="sng" algn="ctr">
-          <a:solidFill>
-            <a:schemeClr val="lt1">
-              <a:hueOff val="0"/>
-              <a:satOff val="0"/>
-              <a:lumOff val="0"/>
-              <a:alphaOff val="0"/>
-            </a:schemeClr>
-          </a:solidFill>
-          <a:prstDash val="solid"/>
-        </a:ln>
-        <a:effectLst/>
-      </dsp:spPr>
-      <dsp:style>
-        <a:lnRef idx="2">
-          <a:scrgbClr r="0" g="0" b="0"/>
-        </a:lnRef>
-        <a:fillRef idx="1">
-          <a:scrgbClr r="0" g="0" b="0"/>
-        </a:fillRef>
-        <a:effectRef idx="0">
-          <a:scrgbClr r="0" g="0" b="0"/>
-        </a:effectRef>
-        <a:fontRef idx="minor">
-          <a:schemeClr val="lt1"/>
-        </a:fontRef>
-      </dsp:style>
-      <dsp:txBody>
-        <a:bodyPr spcFirstLastPara="0" vert="horz" wrap="square" lIns="24130" tIns="24130" rIns="24130" bIns="24130" numCol="1" spcCol="1270" anchor="ctr" anchorCtr="0">
-          <a:noAutofit/>
-        </a:bodyPr>
-        <a:lstStyle/>
-        <a:p>
-          <a:pPr lvl="0" algn="ctr" defTabSz="1689100">
-            <a:lnSpc>
-              <a:spcPct val="90000"/>
-            </a:lnSpc>
-            <a:spcBef>
-              <a:spcPct val="0"/>
-            </a:spcBef>
-            <a:spcAft>
-              <a:spcPct val="35000"/>
-            </a:spcAft>
-          </a:pPr>
-          <a:r>
-            <a:rPr lang="en-US" sz="3800" kern="1200" dirty="0" smtClean="0"/>
-            <a:t>MTG Queue</a:t>
-          </a:r>
-          <a:endParaRPr lang="en-US" sz="3800" kern="1200" dirty="0"/>
-        </a:p>
-      </dsp:txBody>
-      <dsp:txXfrm>
-        <a:off x="6366347" y="73389"/>
-        <a:ext cx="2194781" cy="1064279"/>
-      </dsp:txXfrm>
-    </dsp:sp>
-    <dsp:sp modelId="{C0E7AD36-99BF-42ED-86A6-86CE0D6C6FC3}">
-      <dsp:nvSpPr>
-        <dsp:cNvPr id="0" name=""/>
-        <dsp:cNvSpPr/>
-      </dsp:nvSpPr>
-      <dsp:spPr>
-        <a:xfrm rot="2142401">
-          <a:off x="2158744" y="1540069"/>
-          <a:ext cx="1113773" cy="81035"/>
-        </a:xfrm>
-        <a:custGeom>
-          <a:avLst/>
-          <a:gdLst/>
-          <a:ahLst/>
-          <a:cxnLst/>
-          <a:rect l="0" t="0" r="0" b="0"/>
-          <a:pathLst>
-            <a:path>
-              <a:moveTo>
-                <a:pt x="0" y="40517"/>
-              </a:moveTo>
-              <a:lnTo>
-                <a:pt x="1113773" y="40517"/>
-              </a:lnTo>
-            </a:path>
-          </a:pathLst>
-        </a:custGeom>
-        <a:noFill/>
-        <a:ln w="19050" cap="rnd" cmpd="sng" algn="ctr">
-          <a:solidFill>
-            <a:schemeClr val="accent1">
-              <a:shade val="60000"/>
-              <a:hueOff val="0"/>
-              <a:satOff val="0"/>
-              <a:lumOff val="0"/>
-              <a:alphaOff val="0"/>
-            </a:schemeClr>
-          </a:solidFill>
-          <a:prstDash val="solid"/>
-        </a:ln>
-        <a:effectLst/>
-      </dsp:spPr>
-      <dsp:style>
-        <a:lnRef idx="2">
-          <a:scrgbClr r="0" g="0" b="0"/>
-        </a:lnRef>
-        <a:fillRef idx="0">
-          <a:scrgbClr r="0" g="0" b="0"/>
-        </a:fillRef>
-        <a:effectRef idx="0">
-          <a:scrgbClr r="0" g="0" b="0"/>
-        </a:effectRef>
-        <a:fontRef idx="minor"/>
-      </dsp:style>
-      <dsp:txBody>
-        <a:bodyPr spcFirstLastPara="0" vert="horz" wrap="square" lIns="12700" tIns="0" rIns="12700" bIns="0" numCol="1" spcCol="1270" anchor="ctr" anchorCtr="0">
-          <a:noAutofit/>
-        </a:bodyPr>
-        <a:lstStyle/>
-        <a:p>
-          <a:pPr lvl="0" algn="ctr" defTabSz="222250">
-            <a:lnSpc>
-              <a:spcPct val="90000"/>
-            </a:lnSpc>
-            <a:spcBef>
-              <a:spcPct val="0"/>
-            </a:spcBef>
-            <a:spcAft>
-              <a:spcPct val="35000"/>
-            </a:spcAft>
-          </a:pPr>
-          <a:endParaRPr lang="en-US" sz="500" kern="1200"/>
-        </a:p>
-      </dsp:txBody>
-      <dsp:txXfrm>
-        <a:off x="2687787" y="1552742"/>
-        <a:ext cx="55688" cy="55688"/>
-      </dsp:txXfrm>
-    </dsp:sp>
-    <dsp:sp modelId="{DC6D7D95-A40F-4CC3-8F71-4DF2D4A37C31}">
-      <dsp:nvSpPr>
-        <dsp:cNvPr id="0" name=""/>
-        <dsp:cNvSpPr/>
-      </dsp:nvSpPr>
-      <dsp:spPr>
-        <a:xfrm>
-          <a:off x="3167832" y="1340355"/>
-          <a:ext cx="2261003" cy="1130501"/>
-        </a:xfrm>
-        <a:prstGeom prst="roundRect">
-          <a:avLst>
-            <a:gd name="adj" fmla="val 10000"/>
-          </a:avLst>
-        </a:prstGeom>
-        <a:solidFill>
-          <a:schemeClr val="accent1">
-            <a:hueOff val="0"/>
-            <a:satOff val="0"/>
-            <a:lumOff val="0"/>
-            <a:alphaOff val="0"/>
-          </a:schemeClr>
-        </a:solidFill>
-        <a:ln w="19050" cap="rnd" cmpd="sng" algn="ctr">
-          <a:solidFill>
-            <a:schemeClr val="lt1">
-              <a:hueOff val="0"/>
-              <a:satOff val="0"/>
-              <a:lumOff val="0"/>
-              <a:alphaOff val="0"/>
-            </a:schemeClr>
-          </a:solidFill>
-          <a:prstDash val="solid"/>
-        </a:ln>
-        <a:effectLst/>
-      </dsp:spPr>
-      <dsp:style>
-        <a:lnRef idx="2">
-          <a:scrgbClr r="0" g="0" b="0"/>
-        </a:lnRef>
-        <a:fillRef idx="1">
-          <a:scrgbClr r="0" g="0" b="0"/>
-        </a:fillRef>
-        <a:effectRef idx="0">
-          <a:scrgbClr r="0" g="0" b="0"/>
-        </a:effectRef>
-        <a:fontRef idx="minor">
-          <a:schemeClr val="lt1"/>
-        </a:fontRef>
-      </dsp:style>
-      <dsp:txBody>
-        <a:bodyPr spcFirstLastPara="0" vert="horz" wrap="square" lIns="24130" tIns="24130" rIns="24130" bIns="24130" numCol="1" spcCol="1270" anchor="ctr" anchorCtr="0">
-          <a:noAutofit/>
-        </a:bodyPr>
-        <a:lstStyle/>
-        <a:p>
-          <a:pPr lvl="0" algn="ctr" defTabSz="1689100">
-            <a:lnSpc>
-              <a:spcPct val="90000"/>
-            </a:lnSpc>
-            <a:spcBef>
-              <a:spcPct val="0"/>
-            </a:spcBef>
-            <a:spcAft>
-              <a:spcPct val="35000"/>
-            </a:spcAft>
-          </a:pPr>
-          <a:r>
-            <a:rPr lang="en-US" sz="3800" kern="1200" dirty="0" smtClean="0"/>
-            <a:t>Quick Zone</a:t>
-          </a:r>
-          <a:endParaRPr lang="en-US" sz="3800" kern="1200" dirty="0"/>
-        </a:p>
-      </dsp:txBody>
-      <dsp:txXfrm>
-        <a:off x="3200943" y="1373466"/>
-        <a:ext cx="2194781" cy="1064279"/>
-      </dsp:txXfrm>
-    </dsp:sp>
-    <dsp:sp modelId="{6C804501-E557-4DB6-A979-AC399BDCBBED}">
-      <dsp:nvSpPr>
-        <dsp:cNvPr id="0" name=""/>
-        <dsp:cNvSpPr/>
-      </dsp:nvSpPr>
-      <dsp:spPr>
-        <a:xfrm>
-          <a:off x="5428835" y="1865088"/>
-          <a:ext cx="904401" cy="81035"/>
-        </a:xfrm>
-        <a:custGeom>
-          <a:avLst/>
-          <a:gdLst/>
-          <a:ahLst/>
-          <a:cxnLst/>
-          <a:rect l="0" t="0" r="0" b="0"/>
-          <a:pathLst>
-            <a:path>
-              <a:moveTo>
-                <a:pt x="0" y="40517"/>
-              </a:moveTo>
-              <a:lnTo>
-                <a:pt x="904401" y="40517"/>
-              </a:lnTo>
-            </a:path>
-          </a:pathLst>
-        </a:custGeom>
-        <a:noFill/>
-        <a:ln w="19050" cap="rnd" cmpd="sng" algn="ctr">
-          <a:solidFill>
-            <a:schemeClr val="accent1">
-              <a:shade val="80000"/>
-              <a:hueOff val="0"/>
-              <a:satOff val="0"/>
-              <a:lumOff val="0"/>
-              <a:alphaOff val="0"/>
-            </a:schemeClr>
-          </a:solidFill>
-          <a:prstDash val="solid"/>
-        </a:ln>
-        <a:effectLst/>
-      </dsp:spPr>
-      <dsp:style>
-        <a:lnRef idx="2">
-          <a:scrgbClr r="0" g="0" b="0"/>
-        </a:lnRef>
-        <a:fillRef idx="0">
-          <a:scrgbClr r="0" g="0" b="0"/>
-        </a:fillRef>
-        <a:effectRef idx="0">
-          <a:scrgbClr r="0" g="0" b="0"/>
-        </a:effectRef>
-        <a:fontRef idx="minor"/>
-      </dsp:style>
-      <dsp:txBody>
-        <a:bodyPr spcFirstLastPara="0" vert="horz" wrap="square" lIns="12700" tIns="0" rIns="12700" bIns="0" numCol="1" spcCol="1270" anchor="ctr" anchorCtr="0">
-          <a:noAutofit/>
-        </a:bodyPr>
-        <a:lstStyle/>
-        <a:p>
-          <a:pPr lvl="0" algn="ctr" defTabSz="222250">
-            <a:lnSpc>
-              <a:spcPct val="90000"/>
-            </a:lnSpc>
-            <a:spcBef>
-              <a:spcPct val="0"/>
-            </a:spcBef>
-            <a:spcAft>
-              <a:spcPct val="35000"/>
-            </a:spcAft>
-          </a:pPr>
-          <a:endParaRPr lang="en-US" sz="500" kern="1200"/>
-        </a:p>
-      </dsp:txBody>
-      <dsp:txXfrm>
-        <a:off x="5858426" y="1882996"/>
-        <a:ext cx="45220" cy="45220"/>
-      </dsp:txXfrm>
-    </dsp:sp>
-    <dsp:sp modelId="{52746749-1448-499B-9713-1A9813CF12C5}">
-      <dsp:nvSpPr>
-        <dsp:cNvPr id="0" name=""/>
-        <dsp:cNvSpPr/>
-      </dsp:nvSpPr>
-      <dsp:spPr>
-        <a:xfrm>
-          <a:off x="6333236" y="1340355"/>
-          <a:ext cx="2261003" cy="1130501"/>
-        </a:xfrm>
-        <a:prstGeom prst="roundRect">
-          <a:avLst>
-            <a:gd name="adj" fmla="val 10000"/>
-          </a:avLst>
-        </a:prstGeom>
-        <a:solidFill>
-          <a:schemeClr val="accent1">
-            <a:hueOff val="0"/>
-            <a:satOff val="0"/>
-            <a:lumOff val="0"/>
-            <a:alphaOff val="0"/>
-          </a:schemeClr>
-        </a:solidFill>
-        <a:ln w="19050" cap="rnd" cmpd="sng" algn="ctr">
-          <a:solidFill>
-            <a:schemeClr val="lt1">
-              <a:hueOff val="0"/>
-              <a:satOff val="0"/>
-              <a:lumOff val="0"/>
-              <a:alphaOff val="0"/>
-            </a:schemeClr>
-          </a:solidFill>
-          <a:prstDash val="solid"/>
-        </a:ln>
-        <a:effectLst/>
-      </dsp:spPr>
-      <dsp:style>
-        <a:lnRef idx="2">
-          <a:scrgbClr r="0" g="0" b="0"/>
-        </a:lnRef>
-        <a:fillRef idx="1">
-          <a:scrgbClr r="0" g="0" b="0"/>
-        </a:fillRef>
-        <a:effectRef idx="0">
-          <a:scrgbClr r="0" g="0" b="0"/>
-        </a:effectRef>
-        <a:fontRef idx="minor">
-          <a:schemeClr val="lt1"/>
-        </a:fontRef>
-      </dsp:style>
-      <dsp:txBody>
-        <a:bodyPr spcFirstLastPara="0" vert="horz" wrap="square" lIns="24130" tIns="24130" rIns="24130" bIns="24130" numCol="1" spcCol="1270" anchor="ctr" anchorCtr="0">
-          <a:noAutofit/>
-        </a:bodyPr>
-        <a:lstStyle/>
-        <a:p>
-          <a:pPr lvl="0" algn="ctr" defTabSz="1689100">
-            <a:lnSpc>
-              <a:spcPct val="90000"/>
-            </a:lnSpc>
-            <a:spcBef>
-              <a:spcPct val="0"/>
-            </a:spcBef>
-            <a:spcAft>
-              <a:spcPct val="35000"/>
-            </a:spcAft>
-          </a:pPr>
-          <a:r>
-            <a:rPr lang="en-US" sz="3800" kern="1200" dirty="0" smtClean="0"/>
-            <a:t>Item Selection</a:t>
-          </a:r>
-          <a:endParaRPr lang="en-US" sz="3800" kern="1200" dirty="0"/>
-        </a:p>
-      </dsp:txBody>
-      <dsp:txXfrm>
-        <a:off x="6366347" y="1373466"/>
-        <a:ext cx="2194781" cy="1064279"/>
-      </dsp:txXfrm>
-    </dsp:sp>
   </dsp:spTree>
 </dsp:drawing>
 </file>
@@ -3069,559 +2496,6 @@
       <dsp:cNvGrpSpPr/>
     </dsp:nvGrpSpPr>
     <dsp:grpSpPr/>
-    <dsp:sp modelId="{E75857F3-4947-4919-971C-E51FDD5F1924}">
-      <dsp:nvSpPr>
-        <dsp:cNvPr id="0" name=""/>
-        <dsp:cNvSpPr/>
-      </dsp:nvSpPr>
-      <dsp:spPr>
-        <a:xfrm>
-          <a:off x="339" y="670104"/>
-          <a:ext cx="1863868" cy="931934"/>
-        </a:xfrm>
-        <a:prstGeom prst="roundRect">
-          <a:avLst>
-            <a:gd name="adj" fmla="val 10000"/>
-          </a:avLst>
-        </a:prstGeom>
-        <a:solidFill>
-          <a:schemeClr val="accent1">
-            <a:hueOff val="0"/>
-            <a:satOff val="0"/>
-            <a:lumOff val="0"/>
-            <a:alphaOff val="0"/>
-          </a:schemeClr>
-        </a:solidFill>
-        <a:ln w="19050" cap="rnd" cmpd="sng" algn="ctr">
-          <a:solidFill>
-            <a:schemeClr val="lt1">
-              <a:hueOff val="0"/>
-              <a:satOff val="0"/>
-              <a:lumOff val="0"/>
-              <a:alphaOff val="0"/>
-            </a:schemeClr>
-          </a:solidFill>
-          <a:prstDash val="solid"/>
-        </a:ln>
-        <a:effectLst/>
-      </dsp:spPr>
-      <dsp:style>
-        <a:lnRef idx="2">
-          <a:scrgbClr r="0" g="0" b="0"/>
-        </a:lnRef>
-        <a:fillRef idx="1">
-          <a:scrgbClr r="0" g="0" b="0"/>
-        </a:fillRef>
-        <a:effectRef idx="0">
-          <a:scrgbClr r="0" g="0" b="0"/>
-        </a:effectRef>
-        <a:fontRef idx="minor">
-          <a:schemeClr val="lt1"/>
-        </a:fontRef>
-      </dsp:style>
-      <dsp:txBody>
-        <a:bodyPr spcFirstLastPara="0" vert="horz" wrap="square" lIns="19685" tIns="19685" rIns="19685" bIns="19685" numCol="1" spcCol="1270" anchor="ctr" anchorCtr="0">
-          <a:noAutofit/>
-        </a:bodyPr>
-        <a:lstStyle/>
-        <a:p>
-          <a:pPr lvl="0" algn="ctr" defTabSz="1377950">
-            <a:lnSpc>
-              <a:spcPct val="90000"/>
-            </a:lnSpc>
-            <a:spcBef>
-              <a:spcPct val="0"/>
-            </a:spcBef>
-            <a:spcAft>
-              <a:spcPct val="35000"/>
-            </a:spcAft>
-          </a:pPr>
-          <a:r>
-            <a:rPr lang="en-US" sz="3100" kern="1200" dirty="0" smtClean="0"/>
-            <a:t>MTG Server</a:t>
-          </a:r>
-          <a:endParaRPr lang="en-US" sz="3100" kern="1200" dirty="0"/>
-        </a:p>
-      </dsp:txBody>
-      <dsp:txXfrm>
-        <a:off x="27634" y="697399"/>
-        <a:ext cx="1809278" cy="877344"/>
-      </dsp:txXfrm>
-    </dsp:sp>
-    <dsp:sp modelId="{4AE31128-CCE2-4C5E-B14B-AC2FB1931328}">
-      <dsp:nvSpPr>
-        <dsp:cNvPr id="0" name=""/>
-        <dsp:cNvSpPr/>
-      </dsp:nvSpPr>
-      <dsp:spPr>
-        <a:xfrm>
-          <a:off x="1864207" y="1099157"/>
-          <a:ext cx="745547" cy="73828"/>
-        </a:xfrm>
-        <a:custGeom>
-          <a:avLst/>
-          <a:gdLst/>
-          <a:ahLst/>
-          <a:cxnLst/>
-          <a:rect l="0" t="0" r="0" b="0"/>
-          <a:pathLst>
-            <a:path>
-              <a:moveTo>
-                <a:pt x="0" y="36914"/>
-              </a:moveTo>
-              <a:lnTo>
-                <a:pt x="745547" y="36914"/>
-              </a:lnTo>
-            </a:path>
-          </a:pathLst>
-        </a:custGeom>
-        <a:noFill/>
-        <a:ln w="19050" cap="rnd" cmpd="sng" algn="ctr">
-          <a:solidFill>
-            <a:schemeClr val="accent1">
-              <a:shade val="60000"/>
-              <a:hueOff val="0"/>
-              <a:satOff val="0"/>
-              <a:lumOff val="0"/>
-              <a:alphaOff val="0"/>
-            </a:schemeClr>
-          </a:solidFill>
-          <a:prstDash val="solid"/>
-        </a:ln>
-        <a:effectLst/>
-      </dsp:spPr>
-      <dsp:style>
-        <a:lnRef idx="2">
-          <a:scrgbClr r="0" g="0" b="0"/>
-        </a:lnRef>
-        <a:fillRef idx="0">
-          <a:scrgbClr r="0" g="0" b="0"/>
-        </a:fillRef>
-        <a:effectRef idx="0">
-          <a:scrgbClr r="0" g="0" b="0"/>
-        </a:effectRef>
-        <a:fontRef idx="minor"/>
-      </dsp:style>
-      <dsp:txBody>
-        <a:bodyPr spcFirstLastPara="0" vert="horz" wrap="square" lIns="12700" tIns="0" rIns="12700" bIns="0" numCol="1" spcCol="1270" anchor="ctr" anchorCtr="0">
-          <a:noAutofit/>
-        </a:bodyPr>
-        <a:lstStyle/>
-        <a:p>
-          <a:pPr lvl="0" algn="ctr" defTabSz="222250">
-            <a:lnSpc>
-              <a:spcPct val="90000"/>
-            </a:lnSpc>
-            <a:spcBef>
-              <a:spcPct val="0"/>
-            </a:spcBef>
-            <a:spcAft>
-              <a:spcPct val="35000"/>
-            </a:spcAft>
-          </a:pPr>
-          <a:endParaRPr lang="en-US" sz="500" kern="1200"/>
-        </a:p>
-      </dsp:txBody>
-      <dsp:txXfrm>
-        <a:off x="2218342" y="1117433"/>
-        <a:ext cx="37277" cy="37277"/>
-      </dsp:txXfrm>
-    </dsp:sp>
-    <dsp:sp modelId="{40B2B726-955D-4E64-BEF3-E46FA7084B65}">
-      <dsp:nvSpPr>
-        <dsp:cNvPr id="0" name=""/>
-        <dsp:cNvSpPr/>
-      </dsp:nvSpPr>
-      <dsp:spPr>
-        <a:xfrm>
-          <a:off x="2609754" y="670104"/>
-          <a:ext cx="1863868" cy="931934"/>
-        </a:xfrm>
-        <a:prstGeom prst="roundRect">
-          <a:avLst>
-            <a:gd name="adj" fmla="val 10000"/>
-          </a:avLst>
-        </a:prstGeom>
-        <a:solidFill>
-          <a:schemeClr val="accent1">
-            <a:hueOff val="0"/>
-            <a:satOff val="0"/>
-            <a:lumOff val="0"/>
-            <a:alphaOff val="0"/>
-          </a:schemeClr>
-        </a:solidFill>
-        <a:ln w="19050" cap="rnd" cmpd="sng" algn="ctr">
-          <a:solidFill>
-            <a:schemeClr val="lt1">
-              <a:hueOff val="0"/>
-              <a:satOff val="0"/>
-              <a:lumOff val="0"/>
-              <a:alphaOff val="0"/>
-            </a:schemeClr>
-          </a:solidFill>
-          <a:prstDash val="solid"/>
-        </a:ln>
-        <a:effectLst/>
-      </dsp:spPr>
-      <dsp:style>
-        <a:lnRef idx="2">
-          <a:scrgbClr r="0" g="0" b="0"/>
-        </a:lnRef>
-        <a:fillRef idx="1">
-          <a:scrgbClr r="0" g="0" b="0"/>
-        </a:fillRef>
-        <a:effectRef idx="0">
-          <a:scrgbClr r="0" g="0" b="0"/>
-        </a:effectRef>
-        <a:fontRef idx="minor">
-          <a:schemeClr val="lt1"/>
-        </a:fontRef>
-      </dsp:style>
-      <dsp:txBody>
-        <a:bodyPr spcFirstLastPara="0" vert="horz" wrap="square" lIns="19685" tIns="19685" rIns="19685" bIns="19685" numCol="1" spcCol="1270" anchor="ctr" anchorCtr="0">
-          <a:noAutofit/>
-        </a:bodyPr>
-        <a:lstStyle/>
-        <a:p>
-          <a:pPr lvl="0" algn="ctr" defTabSz="1377950">
-            <a:lnSpc>
-              <a:spcPct val="90000"/>
-            </a:lnSpc>
-            <a:spcBef>
-              <a:spcPct val="0"/>
-            </a:spcBef>
-            <a:spcAft>
-              <a:spcPct val="35000"/>
-            </a:spcAft>
-          </a:pPr>
-          <a:r>
-            <a:rPr lang="en-US" sz="3100" kern="1200" dirty="0" smtClean="0"/>
-            <a:t>Checkout queue</a:t>
-          </a:r>
-          <a:endParaRPr lang="en-US" sz="3100" kern="1200" dirty="0"/>
-        </a:p>
-      </dsp:txBody>
-      <dsp:txXfrm>
-        <a:off x="2637049" y="697399"/>
-        <a:ext cx="1809278" cy="877344"/>
-      </dsp:txXfrm>
-    </dsp:sp>
-    <dsp:sp modelId="{4BD4F569-46C1-4784-801F-B7FD4D73E76C}">
-      <dsp:nvSpPr>
-        <dsp:cNvPr id="0" name=""/>
-        <dsp:cNvSpPr/>
-      </dsp:nvSpPr>
-      <dsp:spPr>
-        <a:xfrm>
-          <a:off x="4473622" y="1099157"/>
-          <a:ext cx="745547" cy="73828"/>
-        </a:xfrm>
-        <a:custGeom>
-          <a:avLst/>
-          <a:gdLst/>
-          <a:ahLst/>
-          <a:cxnLst/>
-          <a:rect l="0" t="0" r="0" b="0"/>
-          <a:pathLst>
-            <a:path>
-              <a:moveTo>
-                <a:pt x="0" y="36914"/>
-              </a:moveTo>
-              <a:lnTo>
-                <a:pt x="745547" y="36914"/>
-              </a:lnTo>
-            </a:path>
-          </a:pathLst>
-        </a:custGeom>
-        <a:noFill/>
-        <a:ln w="19050" cap="rnd" cmpd="sng" algn="ctr">
-          <a:solidFill>
-            <a:schemeClr val="accent1">
-              <a:shade val="80000"/>
-              <a:hueOff val="0"/>
-              <a:satOff val="0"/>
-              <a:lumOff val="0"/>
-              <a:alphaOff val="0"/>
-            </a:schemeClr>
-          </a:solidFill>
-          <a:prstDash val="solid"/>
-        </a:ln>
-        <a:effectLst/>
-      </dsp:spPr>
-      <dsp:style>
-        <a:lnRef idx="2">
-          <a:scrgbClr r="0" g="0" b="0"/>
-        </a:lnRef>
-        <a:fillRef idx="0">
-          <a:scrgbClr r="0" g="0" b="0"/>
-        </a:fillRef>
-        <a:effectRef idx="0">
-          <a:scrgbClr r="0" g="0" b="0"/>
-        </a:effectRef>
-        <a:fontRef idx="minor"/>
-      </dsp:style>
-      <dsp:txBody>
-        <a:bodyPr spcFirstLastPara="0" vert="horz" wrap="square" lIns="12700" tIns="0" rIns="12700" bIns="0" numCol="1" spcCol="1270" anchor="ctr" anchorCtr="0">
-          <a:noAutofit/>
-        </a:bodyPr>
-        <a:lstStyle/>
-        <a:p>
-          <a:pPr lvl="0" algn="ctr" defTabSz="222250">
-            <a:lnSpc>
-              <a:spcPct val="90000"/>
-            </a:lnSpc>
-            <a:spcBef>
-              <a:spcPct val="0"/>
-            </a:spcBef>
-            <a:spcAft>
-              <a:spcPct val="35000"/>
-            </a:spcAft>
-          </a:pPr>
-          <a:endParaRPr lang="en-US" sz="500" kern="1200"/>
-        </a:p>
-      </dsp:txBody>
-      <dsp:txXfrm>
-        <a:off x="4827757" y="1117433"/>
-        <a:ext cx="37277" cy="37277"/>
-      </dsp:txXfrm>
-    </dsp:sp>
-    <dsp:sp modelId="{17A60922-042F-4C03-B020-54BF33068DF3}">
-      <dsp:nvSpPr>
-        <dsp:cNvPr id="0" name=""/>
-        <dsp:cNvSpPr/>
-      </dsp:nvSpPr>
-      <dsp:spPr>
-        <a:xfrm>
-          <a:off x="5219170" y="670104"/>
-          <a:ext cx="1863868" cy="931934"/>
-        </a:xfrm>
-        <a:prstGeom prst="roundRect">
-          <a:avLst>
-            <a:gd name="adj" fmla="val 10000"/>
-          </a:avLst>
-        </a:prstGeom>
-        <a:solidFill>
-          <a:schemeClr val="accent1">
-            <a:hueOff val="0"/>
-            <a:satOff val="0"/>
-            <a:lumOff val="0"/>
-            <a:alphaOff val="0"/>
-          </a:schemeClr>
-        </a:solidFill>
-        <a:ln w="19050" cap="rnd" cmpd="sng" algn="ctr">
-          <a:solidFill>
-            <a:schemeClr val="lt1">
-              <a:hueOff val="0"/>
-              <a:satOff val="0"/>
-              <a:lumOff val="0"/>
-              <a:alphaOff val="0"/>
-            </a:schemeClr>
-          </a:solidFill>
-          <a:prstDash val="solid"/>
-        </a:ln>
-        <a:effectLst/>
-      </dsp:spPr>
-      <dsp:style>
-        <a:lnRef idx="2">
-          <a:scrgbClr r="0" g="0" b="0"/>
-        </a:lnRef>
-        <a:fillRef idx="1">
-          <a:scrgbClr r="0" g="0" b="0"/>
-        </a:fillRef>
-        <a:effectRef idx="0">
-          <a:scrgbClr r="0" g="0" b="0"/>
-        </a:effectRef>
-        <a:fontRef idx="minor">
-          <a:schemeClr val="lt1"/>
-        </a:fontRef>
-      </dsp:style>
-      <dsp:txBody>
-        <a:bodyPr spcFirstLastPara="0" vert="horz" wrap="square" lIns="19685" tIns="19685" rIns="19685" bIns="19685" numCol="1" spcCol="1270" anchor="ctr" anchorCtr="0">
-          <a:noAutofit/>
-        </a:bodyPr>
-        <a:lstStyle/>
-        <a:p>
-          <a:pPr lvl="0" algn="ctr" defTabSz="1377950">
-            <a:lnSpc>
-              <a:spcPct val="90000"/>
-            </a:lnSpc>
-            <a:spcBef>
-              <a:spcPct val="0"/>
-            </a:spcBef>
-            <a:spcAft>
-              <a:spcPct val="35000"/>
-            </a:spcAft>
-          </a:pPr>
-          <a:r>
-            <a:rPr lang="en-US" sz="3100" kern="1200" dirty="0" smtClean="0"/>
-            <a:t>Checkout Server</a:t>
-          </a:r>
-          <a:endParaRPr lang="en-US" sz="3100" kern="1200" dirty="0"/>
-        </a:p>
-      </dsp:txBody>
-      <dsp:txXfrm>
-        <a:off x="5246465" y="697399"/>
-        <a:ext cx="1809278" cy="877344"/>
-      </dsp:txXfrm>
-    </dsp:sp>
-    <dsp:sp modelId="{EC54C2B9-1130-4F49-94FC-D9785D69014C}">
-      <dsp:nvSpPr>
-        <dsp:cNvPr id="0" name=""/>
-        <dsp:cNvSpPr/>
-      </dsp:nvSpPr>
-      <dsp:spPr>
-        <a:xfrm>
-          <a:off x="7083038" y="1099157"/>
-          <a:ext cx="745547" cy="73828"/>
-        </a:xfrm>
-        <a:custGeom>
-          <a:avLst/>
-          <a:gdLst/>
-          <a:ahLst/>
-          <a:cxnLst/>
-          <a:rect l="0" t="0" r="0" b="0"/>
-          <a:pathLst>
-            <a:path>
-              <a:moveTo>
-                <a:pt x="0" y="36914"/>
-              </a:moveTo>
-              <a:lnTo>
-                <a:pt x="745547" y="36914"/>
-              </a:lnTo>
-            </a:path>
-          </a:pathLst>
-        </a:custGeom>
-        <a:noFill/>
-        <a:ln w="19050" cap="rnd" cmpd="sng" algn="ctr">
-          <a:solidFill>
-            <a:schemeClr val="accent1">
-              <a:shade val="80000"/>
-              <a:hueOff val="0"/>
-              <a:satOff val="0"/>
-              <a:lumOff val="0"/>
-              <a:alphaOff val="0"/>
-            </a:schemeClr>
-          </a:solidFill>
-          <a:prstDash val="solid"/>
-        </a:ln>
-        <a:effectLst/>
-      </dsp:spPr>
-      <dsp:style>
-        <a:lnRef idx="2">
-          <a:scrgbClr r="0" g="0" b="0"/>
-        </a:lnRef>
-        <a:fillRef idx="0">
-          <a:scrgbClr r="0" g="0" b="0"/>
-        </a:fillRef>
-        <a:effectRef idx="0">
-          <a:scrgbClr r="0" g="0" b="0"/>
-        </a:effectRef>
-        <a:fontRef idx="minor"/>
-      </dsp:style>
-      <dsp:txBody>
-        <a:bodyPr spcFirstLastPara="0" vert="horz" wrap="square" lIns="12700" tIns="0" rIns="12700" bIns="0" numCol="1" spcCol="1270" anchor="ctr" anchorCtr="0">
-          <a:noAutofit/>
-        </a:bodyPr>
-        <a:lstStyle/>
-        <a:p>
-          <a:pPr lvl="0" algn="ctr" defTabSz="222250">
-            <a:lnSpc>
-              <a:spcPct val="90000"/>
-            </a:lnSpc>
-            <a:spcBef>
-              <a:spcPct val="0"/>
-            </a:spcBef>
-            <a:spcAft>
-              <a:spcPct val="35000"/>
-            </a:spcAft>
-          </a:pPr>
-          <a:endParaRPr lang="en-US" sz="500" kern="1200"/>
-        </a:p>
-      </dsp:txBody>
-      <dsp:txXfrm>
-        <a:off x="7437173" y="1117433"/>
-        <a:ext cx="37277" cy="37277"/>
-      </dsp:txXfrm>
-    </dsp:sp>
-    <dsp:sp modelId="{1C6F0FB2-107F-4E80-B0C6-7D85D179FEB7}">
-      <dsp:nvSpPr>
-        <dsp:cNvPr id="0" name=""/>
-        <dsp:cNvSpPr/>
-      </dsp:nvSpPr>
-      <dsp:spPr>
-        <a:xfrm>
-          <a:off x="7828585" y="670104"/>
-          <a:ext cx="1863868" cy="931934"/>
-        </a:xfrm>
-        <a:prstGeom prst="roundRect">
-          <a:avLst>
-            <a:gd name="adj" fmla="val 10000"/>
-          </a:avLst>
-        </a:prstGeom>
-        <a:solidFill>
-          <a:schemeClr val="accent1">
-            <a:hueOff val="0"/>
-            <a:satOff val="0"/>
-            <a:lumOff val="0"/>
-            <a:alphaOff val="0"/>
-          </a:schemeClr>
-        </a:solidFill>
-        <a:ln w="19050" cap="rnd" cmpd="sng" algn="ctr">
-          <a:solidFill>
-            <a:schemeClr val="lt1">
-              <a:hueOff val="0"/>
-              <a:satOff val="0"/>
-              <a:lumOff val="0"/>
-              <a:alphaOff val="0"/>
-            </a:schemeClr>
-          </a:solidFill>
-          <a:prstDash val="solid"/>
-        </a:ln>
-        <a:effectLst/>
-      </dsp:spPr>
-      <dsp:style>
-        <a:lnRef idx="2">
-          <a:scrgbClr r="0" g="0" b="0"/>
-        </a:lnRef>
-        <a:fillRef idx="1">
-          <a:scrgbClr r="0" g="0" b="0"/>
-        </a:fillRef>
-        <a:effectRef idx="0">
-          <a:scrgbClr r="0" g="0" b="0"/>
-        </a:effectRef>
-        <a:fontRef idx="minor">
-          <a:schemeClr val="lt1"/>
-        </a:fontRef>
-      </dsp:style>
-      <dsp:txBody>
-        <a:bodyPr spcFirstLastPara="0" vert="horz" wrap="square" lIns="19685" tIns="19685" rIns="19685" bIns="19685" numCol="1" spcCol="1270" anchor="ctr" anchorCtr="0">
-          <a:noAutofit/>
-        </a:bodyPr>
-        <a:lstStyle/>
-        <a:p>
-          <a:pPr lvl="0" algn="ctr" defTabSz="1377950">
-            <a:lnSpc>
-              <a:spcPct val="90000"/>
-            </a:lnSpc>
-            <a:spcBef>
-              <a:spcPct val="0"/>
-            </a:spcBef>
-            <a:spcAft>
-              <a:spcPct val="35000"/>
-            </a:spcAft>
-          </a:pPr>
-          <a:r>
-            <a:rPr lang="en-US" sz="3100" kern="1200" dirty="0" smtClean="0"/>
-            <a:t>Customer exit</a:t>
-          </a:r>
-          <a:endParaRPr lang="en-US" sz="3100" kern="1200" dirty="0"/>
-        </a:p>
-      </dsp:txBody>
-      <dsp:txXfrm>
-        <a:off x="7855880" y="697399"/>
-        <a:ext cx="1809278" cy="877344"/>
-      </dsp:txXfrm>
-    </dsp:sp>
   </dsp:spTree>
 </dsp:drawing>
 </file>
@@ -12190,13 +11064,43 @@
         </p:nvSpPr>
         <p:spPr>
           <a:xfrm>
-            <a:off x="677334" y="1381991"/>
-            <a:ext cx="8596668" cy="4659371"/>
+            <a:off x="677334" y="2150919"/>
+            <a:ext cx="8596668" cy="2940627"/>
           </a:xfrm>
         </p:spPr>
         <p:txBody>
           <a:bodyPr/>
           <a:lstStyle/>
+          <a:p>
+            <a:r>
+              <a:rPr lang="en-US" dirty="0" smtClean="0"/>
+              <a:t>Simulation of Market To-Go and Quick Zone dinning services</a:t>
+            </a:r>
+          </a:p>
+          <a:p>
+            <a:r>
+              <a:rPr lang="en-US" dirty="0" smtClean="0"/>
+              <a:t>Use different server configurations to determine best way to improve server efficiency while maintaining acceptable profits and wait times</a:t>
+            </a:r>
+          </a:p>
+          <a:p>
+            <a:r>
+              <a:rPr lang="en-US" dirty="0" smtClean="0"/>
+              <a:t>Possible Future Experiments:</a:t>
+            </a:r>
+          </a:p>
+          <a:p>
+            <a:r>
+              <a:rPr lang="en-US" dirty="0" smtClean="0"/>
+              <a:t>Run with different service areas in each location to model real environment as precisely as possible</a:t>
+            </a:r>
+          </a:p>
+          <a:p>
+            <a:r>
+              <a:rPr lang="en-US" dirty="0" smtClean="0"/>
+              <a:t> Run with the customer having the ability to choose both locations</a:t>
+            </a:r>
+          </a:p>
           <a:p>
             <a:endParaRPr lang="en-US" dirty="0"/>
           </a:p>
@@ -12777,11 +11681,7 @@
           <a:p>
             <a:r>
               <a:rPr lang="en-US" dirty="0" smtClean="0"/>
-              <a:t>Checkout service times:  </a:t>
-            </a:r>
-            <a:r>
-              <a:rPr lang="en-US" dirty="0" smtClean="0"/>
-              <a:t>Exponential Distribution </a:t>
+              <a:t>Checkout service times:  Exponential Distribution </a:t>
             </a:r>
           </a:p>
         </p:txBody>
@@ -13065,7 +11965,7 @@
         </p:nvSpPr>
         <p:spPr>
           <a:xfrm>
-            <a:off x="677334" y="2067792"/>
+            <a:off x="677334" y="2483429"/>
             <a:ext cx="8596668" cy="2743199"/>
           </a:xfrm>
         </p:spPr>

</xml_diff>

<commit_message>
Added some stuff about verifying assumptions
I’m neurotic, and this will be a ton of work in practice
</commit_message>
<xml_diff>
--- a/SimPres.pptx
+++ b/SimPres.pptx
@@ -13,8 +13,10 @@
     <p:sldId id="261" r:id="rId7"/>
     <p:sldId id="262" r:id="rId8"/>
     <p:sldId id="263" r:id="rId9"/>
-    <p:sldId id="264" r:id="rId10"/>
-    <p:sldId id="265" r:id="rId11"/>
+    <p:sldId id="266" r:id="rId10"/>
+    <p:sldId id="267" r:id="rId11"/>
+    <p:sldId id="264" r:id="rId12"/>
+    <p:sldId id="265" r:id="rId13"/>
   </p:sldIdLst>
   <p:sldSz cx="12192000" cy="6858000"/>
   <p:notesSz cx="6858000" cy="9144000"/>
@@ -115,7 +117,7 @@
   </p:defaultTextStyle>
   <p:extLst>
     <p:ext uri="{EFAFB233-063F-42B5-8137-9DF3F51BA10A}">
-      <p15:sldGuideLst xmlns:p15="http://schemas.microsoft.com/office/powerpoint/2012/main"/>
+      <p15:sldGuideLst xmlns:p15="http://schemas.microsoft.com/office/powerpoint/2012/main" xmlns=""/>
     </p:ext>
   </p:extLst>
 </p:presentation>
@@ -2484,6 +2486,717 @@
       <dsp:cNvGrpSpPr/>
     </dsp:nvGrpSpPr>
     <dsp:grpSpPr/>
+    <dsp:sp modelId="{E75857F3-4947-4919-971C-E51FDD5F1924}">
+      <dsp:nvSpPr>
+        <dsp:cNvPr id="0" name=""/>
+        <dsp:cNvSpPr/>
+      </dsp:nvSpPr>
+      <dsp:spPr>
+        <a:xfrm>
+          <a:off x="2427" y="690317"/>
+          <a:ext cx="2261003" cy="1130501"/>
+        </a:xfrm>
+        <a:prstGeom prst="roundRect">
+          <a:avLst>
+            <a:gd name="adj" fmla="val 10000"/>
+          </a:avLst>
+        </a:prstGeom>
+        <a:solidFill>
+          <a:schemeClr val="accent1">
+            <a:hueOff val="0"/>
+            <a:satOff val="0"/>
+            <a:lumOff val="0"/>
+            <a:alphaOff val="0"/>
+          </a:schemeClr>
+        </a:solidFill>
+        <a:ln w="19050" cap="rnd" cmpd="sng" algn="ctr">
+          <a:solidFill>
+            <a:schemeClr val="lt1">
+              <a:hueOff val="0"/>
+              <a:satOff val="0"/>
+              <a:lumOff val="0"/>
+              <a:alphaOff val="0"/>
+            </a:schemeClr>
+          </a:solidFill>
+          <a:prstDash val="solid"/>
+        </a:ln>
+        <a:effectLst/>
+      </dsp:spPr>
+      <dsp:style>
+        <a:lnRef idx="2">
+          <a:scrgbClr r="0" g="0" b="0"/>
+        </a:lnRef>
+        <a:fillRef idx="1">
+          <a:scrgbClr r="0" g="0" b="0"/>
+        </a:fillRef>
+        <a:effectRef idx="0">
+          <a:scrgbClr r="0" g="0" b="0"/>
+        </a:effectRef>
+        <a:fontRef idx="minor">
+          <a:schemeClr val="lt1"/>
+        </a:fontRef>
+      </dsp:style>
+      <dsp:txBody>
+        <a:bodyPr spcFirstLastPara="0" vert="horz" wrap="square" lIns="22860" tIns="22860" rIns="22860" bIns="22860" numCol="1" spcCol="1270" anchor="ctr" anchorCtr="0">
+          <a:noAutofit/>
+        </a:bodyPr>
+        <a:lstStyle/>
+        <a:p>
+          <a:pPr lvl="0" algn="ctr" defTabSz="1600200">
+            <a:lnSpc>
+              <a:spcPct val="90000"/>
+            </a:lnSpc>
+            <a:spcBef>
+              <a:spcPct val="0"/>
+            </a:spcBef>
+            <a:spcAft>
+              <a:spcPct val="35000"/>
+            </a:spcAft>
+          </a:pPr>
+          <a:r>
+            <a:rPr lang="en-US" sz="3600" kern="1200" dirty="0" smtClean="0"/>
+            <a:t>Arrivals</a:t>
+          </a:r>
+          <a:endParaRPr lang="en-US" sz="3600" kern="1200" dirty="0"/>
+        </a:p>
+      </dsp:txBody>
+      <dsp:txXfrm>
+        <a:off x="35538" y="723428"/>
+        <a:ext cx="2194781" cy="1064279"/>
+      </dsp:txXfrm>
+    </dsp:sp>
+    <dsp:sp modelId="{66E54A8B-1F85-44F4-BBB8-364A76B13FF8}">
+      <dsp:nvSpPr>
+        <dsp:cNvPr id="0" name=""/>
+        <dsp:cNvSpPr/>
+      </dsp:nvSpPr>
+      <dsp:spPr>
+        <a:xfrm rot="19457599">
+          <a:off x="2158744" y="890031"/>
+          <a:ext cx="1113773" cy="81035"/>
+        </a:xfrm>
+        <a:custGeom>
+          <a:avLst/>
+          <a:gdLst/>
+          <a:ahLst/>
+          <a:cxnLst/>
+          <a:rect l="0" t="0" r="0" b="0"/>
+          <a:pathLst>
+            <a:path>
+              <a:moveTo>
+                <a:pt x="0" y="40517"/>
+              </a:moveTo>
+              <a:lnTo>
+                <a:pt x="1113773" y="40517"/>
+              </a:lnTo>
+            </a:path>
+          </a:pathLst>
+        </a:custGeom>
+        <a:noFill/>
+        <a:ln w="19050" cap="rnd" cmpd="sng" algn="ctr">
+          <a:solidFill>
+            <a:schemeClr val="accent1">
+              <a:shade val="60000"/>
+              <a:hueOff val="0"/>
+              <a:satOff val="0"/>
+              <a:lumOff val="0"/>
+              <a:alphaOff val="0"/>
+            </a:schemeClr>
+          </a:solidFill>
+          <a:prstDash val="solid"/>
+        </a:ln>
+        <a:effectLst/>
+      </dsp:spPr>
+      <dsp:style>
+        <a:lnRef idx="2">
+          <a:scrgbClr r="0" g="0" b="0"/>
+        </a:lnRef>
+        <a:fillRef idx="0">
+          <a:scrgbClr r="0" g="0" b="0"/>
+        </a:fillRef>
+        <a:effectRef idx="0">
+          <a:scrgbClr r="0" g="0" b="0"/>
+        </a:effectRef>
+        <a:fontRef idx="minor"/>
+      </dsp:style>
+      <dsp:txBody>
+        <a:bodyPr spcFirstLastPara="0" vert="horz" wrap="square" lIns="12700" tIns="0" rIns="12700" bIns="0" numCol="1" spcCol="1270" anchor="ctr" anchorCtr="0">
+          <a:noAutofit/>
+        </a:bodyPr>
+        <a:lstStyle/>
+        <a:p>
+          <a:pPr lvl="0" algn="ctr" defTabSz="222250">
+            <a:lnSpc>
+              <a:spcPct val="90000"/>
+            </a:lnSpc>
+            <a:spcBef>
+              <a:spcPct val="0"/>
+            </a:spcBef>
+            <a:spcAft>
+              <a:spcPct val="35000"/>
+            </a:spcAft>
+          </a:pPr>
+          <a:endParaRPr lang="en-US" sz="500" kern="1200"/>
+        </a:p>
+      </dsp:txBody>
+      <dsp:txXfrm>
+        <a:off x="2687787" y="902704"/>
+        <a:ext cx="55688" cy="55688"/>
+      </dsp:txXfrm>
+    </dsp:sp>
+    <dsp:sp modelId="{87C7D4D0-FC0F-4C1D-836A-CE59F03CB85E}">
+      <dsp:nvSpPr>
+        <dsp:cNvPr id="0" name=""/>
+        <dsp:cNvSpPr/>
+      </dsp:nvSpPr>
+      <dsp:spPr>
+        <a:xfrm>
+          <a:off x="3167832" y="40278"/>
+          <a:ext cx="2261003" cy="1130501"/>
+        </a:xfrm>
+        <a:prstGeom prst="roundRect">
+          <a:avLst>
+            <a:gd name="adj" fmla="val 10000"/>
+          </a:avLst>
+        </a:prstGeom>
+        <a:solidFill>
+          <a:schemeClr val="accent1">
+            <a:hueOff val="0"/>
+            <a:satOff val="0"/>
+            <a:lumOff val="0"/>
+            <a:alphaOff val="0"/>
+          </a:schemeClr>
+        </a:solidFill>
+        <a:ln w="19050" cap="rnd" cmpd="sng" algn="ctr">
+          <a:solidFill>
+            <a:schemeClr val="lt1">
+              <a:hueOff val="0"/>
+              <a:satOff val="0"/>
+              <a:lumOff val="0"/>
+              <a:alphaOff val="0"/>
+            </a:schemeClr>
+          </a:solidFill>
+          <a:prstDash val="solid"/>
+        </a:ln>
+        <a:effectLst/>
+      </dsp:spPr>
+      <dsp:style>
+        <a:lnRef idx="2">
+          <a:scrgbClr r="0" g="0" b="0"/>
+        </a:lnRef>
+        <a:fillRef idx="1">
+          <a:scrgbClr r="0" g="0" b="0"/>
+        </a:fillRef>
+        <a:effectRef idx="0">
+          <a:scrgbClr r="0" g="0" b="0"/>
+        </a:effectRef>
+        <a:fontRef idx="minor">
+          <a:schemeClr val="lt1"/>
+        </a:fontRef>
+      </dsp:style>
+      <dsp:txBody>
+        <a:bodyPr spcFirstLastPara="0" vert="horz" wrap="square" lIns="22860" tIns="22860" rIns="22860" bIns="22860" numCol="1" spcCol="1270" anchor="ctr" anchorCtr="0">
+          <a:noAutofit/>
+        </a:bodyPr>
+        <a:lstStyle/>
+        <a:p>
+          <a:pPr lvl="0" algn="ctr" defTabSz="1600200">
+            <a:lnSpc>
+              <a:spcPct val="90000"/>
+            </a:lnSpc>
+            <a:spcBef>
+              <a:spcPct val="0"/>
+            </a:spcBef>
+            <a:spcAft>
+              <a:spcPct val="35000"/>
+            </a:spcAft>
+          </a:pPr>
+          <a:r>
+            <a:rPr lang="en-US" sz="3600" kern="1200" dirty="0" smtClean="0"/>
+            <a:t>Market To-Go</a:t>
+          </a:r>
+          <a:endParaRPr lang="en-US" sz="3600" kern="1200" dirty="0"/>
+        </a:p>
+      </dsp:txBody>
+      <dsp:txXfrm>
+        <a:off x="3200943" y="73389"/>
+        <a:ext cx="2194781" cy="1064279"/>
+      </dsp:txXfrm>
+    </dsp:sp>
+    <dsp:sp modelId="{771A45F1-6EC3-432F-AB76-4AE0A10B21E5}">
+      <dsp:nvSpPr>
+        <dsp:cNvPr id="0" name=""/>
+        <dsp:cNvSpPr/>
+      </dsp:nvSpPr>
+      <dsp:spPr>
+        <a:xfrm>
+          <a:off x="5428835" y="565011"/>
+          <a:ext cx="904401" cy="81035"/>
+        </a:xfrm>
+        <a:custGeom>
+          <a:avLst/>
+          <a:gdLst/>
+          <a:ahLst/>
+          <a:cxnLst/>
+          <a:rect l="0" t="0" r="0" b="0"/>
+          <a:pathLst>
+            <a:path>
+              <a:moveTo>
+                <a:pt x="0" y="40517"/>
+              </a:moveTo>
+              <a:lnTo>
+                <a:pt x="904401" y="40517"/>
+              </a:lnTo>
+            </a:path>
+          </a:pathLst>
+        </a:custGeom>
+        <a:noFill/>
+        <a:ln w="19050" cap="rnd" cmpd="sng" algn="ctr">
+          <a:solidFill>
+            <a:schemeClr val="accent1">
+              <a:shade val="80000"/>
+              <a:hueOff val="0"/>
+              <a:satOff val="0"/>
+              <a:lumOff val="0"/>
+              <a:alphaOff val="0"/>
+            </a:schemeClr>
+          </a:solidFill>
+          <a:prstDash val="solid"/>
+        </a:ln>
+        <a:effectLst/>
+      </dsp:spPr>
+      <dsp:style>
+        <a:lnRef idx="2">
+          <a:scrgbClr r="0" g="0" b="0"/>
+        </a:lnRef>
+        <a:fillRef idx="0">
+          <a:scrgbClr r="0" g="0" b="0"/>
+        </a:fillRef>
+        <a:effectRef idx="0">
+          <a:scrgbClr r="0" g="0" b="0"/>
+        </a:effectRef>
+        <a:fontRef idx="minor"/>
+      </dsp:style>
+      <dsp:txBody>
+        <a:bodyPr spcFirstLastPara="0" vert="horz" wrap="square" lIns="12700" tIns="0" rIns="12700" bIns="0" numCol="1" spcCol="1270" anchor="ctr" anchorCtr="0">
+          <a:noAutofit/>
+        </a:bodyPr>
+        <a:lstStyle/>
+        <a:p>
+          <a:pPr lvl="0" algn="ctr" defTabSz="222250">
+            <a:lnSpc>
+              <a:spcPct val="90000"/>
+            </a:lnSpc>
+            <a:spcBef>
+              <a:spcPct val="0"/>
+            </a:spcBef>
+            <a:spcAft>
+              <a:spcPct val="35000"/>
+            </a:spcAft>
+          </a:pPr>
+          <a:endParaRPr lang="en-US" sz="500" kern="1200"/>
+        </a:p>
+      </dsp:txBody>
+      <dsp:txXfrm>
+        <a:off x="5858426" y="582919"/>
+        <a:ext cx="45220" cy="45220"/>
+      </dsp:txXfrm>
+    </dsp:sp>
+    <dsp:sp modelId="{8328A7F7-84F2-4D75-9080-6A957664729A}">
+      <dsp:nvSpPr>
+        <dsp:cNvPr id="0" name=""/>
+        <dsp:cNvSpPr/>
+      </dsp:nvSpPr>
+      <dsp:spPr>
+        <a:xfrm>
+          <a:off x="6333236" y="40278"/>
+          <a:ext cx="2261003" cy="1130501"/>
+        </a:xfrm>
+        <a:prstGeom prst="roundRect">
+          <a:avLst>
+            <a:gd name="adj" fmla="val 10000"/>
+          </a:avLst>
+        </a:prstGeom>
+        <a:solidFill>
+          <a:schemeClr val="accent1">
+            <a:hueOff val="0"/>
+            <a:satOff val="0"/>
+            <a:lumOff val="0"/>
+            <a:alphaOff val="0"/>
+          </a:schemeClr>
+        </a:solidFill>
+        <a:ln w="19050" cap="rnd" cmpd="sng" algn="ctr">
+          <a:solidFill>
+            <a:schemeClr val="lt1">
+              <a:hueOff val="0"/>
+              <a:satOff val="0"/>
+              <a:lumOff val="0"/>
+              <a:alphaOff val="0"/>
+            </a:schemeClr>
+          </a:solidFill>
+          <a:prstDash val="solid"/>
+        </a:ln>
+        <a:effectLst/>
+      </dsp:spPr>
+      <dsp:style>
+        <a:lnRef idx="2">
+          <a:scrgbClr r="0" g="0" b="0"/>
+        </a:lnRef>
+        <a:fillRef idx="1">
+          <a:scrgbClr r="0" g="0" b="0"/>
+        </a:fillRef>
+        <a:effectRef idx="0">
+          <a:scrgbClr r="0" g="0" b="0"/>
+        </a:effectRef>
+        <a:fontRef idx="minor">
+          <a:schemeClr val="lt1"/>
+        </a:fontRef>
+      </dsp:style>
+      <dsp:txBody>
+        <a:bodyPr spcFirstLastPara="0" vert="horz" wrap="square" lIns="22860" tIns="22860" rIns="22860" bIns="22860" numCol="1" spcCol="1270" anchor="ctr" anchorCtr="0">
+          <a:noAutofit/>
+        </a:bodyPr>
+        <a:lstStyle/>
+        <a:p>
+          <a:pPr lvl="0" algn="ctr" defTabSz="1600200">
+            <a:lnSpc>
+              <a:spcPct val="90000"/>
+            </a:lnSpc>
+            <a:spcBef>
+              <a:spcPct val="0"/>
+            </a:spcBef>
+            <a:spcAft>
+              <a:spcPct val="35000"/>
+            </a:spcAft>
+          </a:pPr>
+          <a:r>
+            <a:rPr lang="en-US" sz="3600" kern="1200" dirty="0" smtClean="0"/>
+            <a:t>MTG Queue</a:t>
+          </a:r>
+          <a:endParaRPr lang="en-US" sz="3600" kern="1200" dirty="0"/>
+        </a:p>
+      </dsp:txBody>
+      <dsp:txXfrm>
+        <a:off x="6366347" y="73389"/>
+        <a:ext cx="2194781" cy="1064279"/>
+      </dsp:txXfrm>
+    </dsp:sp>
+    <dsp:sp modelId="{C0E7AD36-99BF-42ED-86A6-86CE0D6C6FC3}">
+      <dsp:nvSpPr>
+        <dsp:cNvPr id="0" name=""/>
+        <dsp:cNvSpPr/>
+      </dsp:nvSpPr>
+      <dsp:spPr>
+        <a:xfrm rot="2142401">
+          <a:off x="2158744" y="1540069"/>
+          <a:ext cx="1113773" cy="81035"/>
+        </a:xfrm>
+        <a:custGeom>
+          <a:avLst/>
+          <a:gdLst/>
+          <a:ahLst/>
+          <a:cxnLst/>
+          <a:rect l="0" t="0" r="0" b="0"/>
+          <a:pathLst>
+            <a:path>
+              <a:moveTo>
+                <a:pt x="0" y="40517"/>
+              </a:moveTo>
+              <a:lnTo>
+                <a:pt x="1113773" y="40517"/>
+              </a:lnTo>
+            </a:path>
+          </a:pathLst>
+        </a:custGeom>
+        <a:noFill/>
+        <a:ln w="19050" cap="rnd" cmpd="sng" algn="ctr">
+          <a:solidFill>
+            <a:schemeClr val="accent1">
+              <a:shade val="60000"/>
+              <a:hueOff val="0"/>
+              <a:satOff val="0"/>
+              <a:lumOff val="0"/>
+              <a:alphaOff val="0"/>
+            </a:schemeClr>
+          </a:solidFill>
+          <a:prstDash val="solid"/>
+        </a:ln>
+        <a:effectLst/>
+      </dsp:spPr>
+      <dsp:style>
+        <a:lnRef idx="2">
+          <a:scrgbClr r="0" g="0" b="0"/>
+        </a:lnRef>
+        <a:fillRef idx="0">
+          <a:scrgbClr r="0" g="0" b="0"/>
+        </a:fillRef>
+        <a:effectRef idx="0">
+          <a:scrgbClr r="0" g="0" b="0"/>
+        </a:effectRef>
+        <a:fontRef idx="minor"/>
+      </dsp:style>
+      <dsp:txBody>
+        <a:bodyPr spcFirstLastPara="0" vert="horz" wrap="square" lIns="12700" tIns="0" rIns="12700" bIns="0" numCol="1" spcCol="1270" anchor="ctr" anchorCtr="0">
+          <a:noAutofit/>
+        </a:bodyPr>
+        <a:lstStyle/>
+        <a:p>
+          <a:pPr lvl="0" algn="ctr" defTabSz="222250">
+            <a:lnSpc>
+              <a:spcPct val="90000"/>
+            </a:lnSpc>
+            <a:spcBef>
+              <a:spcPct val="0"/>
+            </a:spcBef>
+            <a:spcAft>
+              <a:spcPct val="35000"/>
+            </a:spcAft>
+          </a:pPr>
+          <a:endParaRPr lang="en-US" sz="500" kern="1200"/>
+        </a:p>
+      </dsp:txBody>
+      <dsp:txXfrm>
+        <a:off x="2687787" y="1552742"/>
+        <a:ext cx="55688" cy="55688"/>
+      </dsp:txXfrm>
+    </dsp:sp>
+    <dsp:sp modelId="{DC6D7D95-A40F-4CC3-8F71-4DF2D4A37C31}">
+      <dsp:nvSpPr>
+        <dsp:cNvPr id="0" name=""/>
+        <dsp:cNvSpPr/>
+      </dsp:nvSpPr>
+      <dsp:spPr>
+        <a:xfrm>
+          <a:off x="3167832" y="1340355"/>
+          <a:ext cx="2261003" cy="1130501"/>
+        </a:xfrm>
+        <a:prstGeom prst="roundRect">
+          <a:avLst>
+            <a:gd name="adj" fmla="val 10000"/>
+          </a:avLst>
+        </a:prstGeom>
+        <a:solidFill>
+          <a:schemeClr val="accent1">
+            <a:hueOff val="0"/>
+            <a:satOff val="0"/>
+            <a:lumOff val="0"/>
+            <a:alphaOff val="0"/>
+          </a:schemeClr>
+        </a:solidFill>
+        <a:ln w="19050" cap="rnd" cmpd="sng" algn="ctr">
+          <a:solidFill>
+            <a:schemeClr val="lt1">
+              <a:hueOff val="0"/>
+              <a:satOff val="0"/>
+              <a:lumOff val="0"/>
+              <a:alphaOff val="0"/>
+            </a:schemeClr>
+          </a:solidFill>
+          <a:prstDash val="solid"/>
+        </a:ln>
+        <a:effectLst/>
+      </dsp:spPr>
+      <dsp:style>
+        <a:lnRef idx="2">
+          <a:scrgbClr r="0" g="0" b="0"/>
+        </a:lnRef>
+        <a:fillRef idx="1">
+          <a:scrgbClr r="0" g="0" b="0"/>
+        </a:fillRef>
+        <a:effectRef idx="0">
+          <a:scrgbClr r="0" g="0" b="0"/>
+        </a:effectRef>
+        <a:fontRef idx="minor">
+          <a:schemeClr val="lt1"/>
+        </a:fontRef>
+      </dsp:style>
+      <dsp:txBody>
+        <a:bodyPr spcFirstLastPara="0" vert="horz" wrap="square" lIns="22860" tIns="22860" rIns="22860" bIns="22860" numCol="1" spcCol="1270" anchor="ctr" anchorCtr="0">
+          <a:noAutofit/>
+        </a:bodyPr>
+        <a:lstStyle/>
+        <a:p>
+          <a:pPr lvl="0" algn="ctr" defTabSz="1600200">
+            <a:lnSpc>
+              <a:spcPct val="90000"/>
+            </a:lnSpc>
+            <a:spcBef>
+              <a:spcPct val="0"/>
+            </a:spcBef>
+            <a:spcAft>
+              <a:spcPct val="35000"/>
+            </a:spcAft>
+          </a:pPr>
+          <a:r>
+            <a:rPr lang="en-US" sz="3600" kern="1200" dirty="0" smtClean="0"/>
+            <a:t>Quick Zone</a:t>
+          </a:r>
+          <a:endParaRPr lang="en-US" sz="3600" kern="1200" dirty="0"/>
+        </a:p>
+      </dsp:txBody>
+      <dsp:txXfrm>
+        <a:off x="3200943" y="1373466"/>
+        <a:ext cx="2194781" cy="1064279"/>
+      </dsp:txXfrm>
+    </dsp:sp>
+    <dsp:sp modelId="{6C804501-E557-4DB6-A979-AC399BDCBBED}">
+      <dsp:nvSpPr>
+        <dsp:cNvPr id="0" name=""/>
+        <dsp:cNvSpPr/>
+      </dsp:nvSpPr>
+      <dsp:spPr>
+        <a:xfrm>
+          <a:off x="5428835" y="1865088"/>
+          <a:ext cx="904401" cy="81035"/>
+        </a:xfrm>
+        <a:custGeom>
+          <a:avLst/>
+          <a:gdLst/>
+          <a:ahLst/>
+          <a:cxnLst/>
+          <a:rect l="0" t="0" r="0" b="0"/>
+          <a:pathLst>
+            <a:path>
+              <a:moveTo>
+                <a:pt x="0" y="40517"/>
+              </a:moveTo>
+              <a:lnTo>
+                <a:pt x="904401" y="40517"/>
+              </a:lnTo>
+            </a:path>
+          </a:pathLst>
+        </a:custGeom>
+        <a:noFill/>
+        <a:ln w="19050" cap="rnd" cmpd="sng" algn="ctr">
+          <a:solidFill>
+            <a:schemeClr val="accent1">
+              <a:shade val="80000"/>
+              <a:hueOff val="0"/>
+              <a:satOff val="0"/>
+              <a:lumOff val="0"/>
+              <a:alphaOff val="0"/>
+            </a:schemeClr>
+          </a:solidFill>
+          <a:prstDash val="solid"/>
+        </a:ln>
+        <a:effectLst/>
+      </dsp:spPr>
+      <dsp:style>
+        <a:lnRef idx="2">
+          <a:scrgbClr r="0" g="0" b="0"/>
+        </a:lnRef>
+        <a:fillRef idx="0">
+          <a:scrgbClr r="0" g="0" b="0"/>
+        </a:fillRef>
+        <a:effectRef idx="0">
+          <a:scrgbClr r="0" g="0" b="0"/>
+        </a:effectRef>
+        <a:fontRef idx="minor"/>
+      </dsp:style>
+      <dsp:txBody>
+        <a:bodyPr spcFirstLastPara="0" vert="horz" wrap="square" lIns="12700" tIns="0" rIns="12700" bIns="0" numCol="1" spcCol="1270" anchor="ctr" anchorCtr="0">
+          <a:noAutofit/>
+        </a:bodyPr>
+        <a:lstStyle/>
+        <a:p>
+          <a:pPr lvl="0" algn="ctr" defTabSz="222250">
+            <a:lnSpc>
+              <a:spcPct val="90000"/>
+            </a:lnSpc>
+            <a:spcBef>
+              <a:spcPct val="0"/>
+            </a:spcBef>
+            <a:spcAft>
+              <a:spcPct val="35000"/>
+            </a:spcAft>
+          </a:pPr>
+          <a:endParaRPr lang="en-US" sz="500" kern="1200"/>
+        </a:p>
+      </dsp:txBody>
+      <dsp:txXfrm>
+        <a:off x="5858426" y="1882996"/>
+        <a:ext cx="45220" cy="45220"/>
+      </dsp:txXfrm>
+    </dsp:sp>
+    <dsp:sp modelId="{52746749-1448-499B-9713-1A9813CF12C5}">
+      <dsp:nvSpPr>
+        <dsp:cNvPr id="0" name=""/>
+        <dsp:cNvSpPr/>
+      </dsp:nvSpPr>
+      <dsp:spPr>
+        <a:xfrm>
+          <a:off x="6333236" y="1340355"/>
+          <a:ext cx="2261003" cy="1130501"/>
+        </a:xfrm>
+        <a:prstGeom prst="roundRect">
+          <a:avLst>
+            <a:gd name="adj" fmla="val 10000"/>
+          </a:avLst>
+        </a:prstGeom>
+        <a:solidFill>
+          <a:schemeClr val="accent1">
+            <a:hueOff val="0"/>
+            <a:satOff val="0"/>
+            <a:lumOff val="0"/>
+            <a:alphaOff val="0"/>
+          </a:schemeClr>
+        </a:solidFill>
+        <a:ln w="19050" cap="rnd" cmpd="sng" algn="ctr">
+          <a:solidFill>
+            <a:schemeClr val="lt1">
+              <a:hueOff val="0"/>
+              <a:satOff val="0"/>
+              <a:lumOff val="0"/>
+              <a:alphaOff val="0"/>
+            </a:schemeClr>
+          </a:solidFill>
+          <a:prstDash val="solid"/>
+        </a:ln>
+        <a:effectLst/>
+      </dsp:spPr>
+      <dsp:style>
+        <a:lnRef idx="2">
+          <a:scrgbClr r="0" g="0" b="0"/>
+        </a:lnRef>
+        <a:fillRef idx="1">
+          <a:scrgbClr r="0" g="0" b="0"/>
+        </a:fillRef>
+        <a:effectRef idx="0">
+          <a:scrgbClr r="0" g="0" b="0"/>
+        </a:effectRef>
+        <a:fontRef idx="minor">
+          <a:schemeClr val="lt1"/>
+        </a:fontRef>
+      </dsp:style>
+      <dsp:txBody>
+        <a:bodyPr spcFirstLastPara="0" vert="horz" wrap="square" lIns="22860" tIns="22860" rIns="22860" bIns="22860" numCol="1" spcCol="1270" anchor="ctr" anchorCtr="0">
+          <a:noAutofit/>
+        </a:bodyPr>
+        <a:lstStyle/>
+        <a:p>
+          <a:pPr lvl="0" algn="ctr" defTabSz="1600200">
+            <a:lnSpc>
+              <a:spcPct val="90000"/>
+            </a:lnSpc>
+            <a:spcBef>
+              <a:spcPct val="0"/>
+            </a:spcBef>
+            <a:spcAft>
+              <a:spcPct val="35000"/>
+            </a:spcAft>
+          </a:pPr>
+          <a:r>
+            <a:rPr lang="en-US" sz="3600" kern="1200" dirty="0" smtClean="0"/>
+            <a:t>Item Selection</a:t>
+          </a:r>
+          <a:endParaRPr lang="en-US" sz="3600" kern="1200" dirty="0"/>
+        </a:p>
+      </dsp:txBody>
+      <dsp:txXfrm>
+        <a:off x="6366347" y="1373466"/>
+        <a:ext cx="2194781" cy="1064279"/>
+      </dsp:txXfrm>
+    </dsp:sp>
   </dsp:spTree>
 </dsp:drawing>
 </file>
@@ -2496,6 +3209,559 @@
       <dsp:cNvGrpSpPr/>
     </dsp:nvGrpSpPr>
     <dsp:grpSpPr/>
+    <dsp:sp modelId="{E75857F3-4947-4919-971C-E51FDD5F1924}">
+      <dsp:nvSpPr>
+        <dsp:cNvPr id="0" name=""/>
+        <dsp:cNvSpPr/>
+      </dsp:nvSpPr>
+      <dsp:spPr>
+        <a:xfrm>
+          <a:off x="339" y="670104"/>
+          <a:ext cx="1863868" cy="931934"/>
+        </a:xfrm>
+        <a:prstGeom prst="roundRect">
+          <a:avLst>
+            <a:gd name="adj" fmla="val 10000"/>
+          </a:avLst>
+        </a:prstGeom>
+        <a:solidFill>
+          <a:schemeClr val="accent1">
+            <a:hueOff val="0"/>
+            <a:satOff val="0"/>
+            <a:lumOff val="0"/>
+            <a:alphaOff val="0"/>
+          </a:schemeClr>
+        </a:solidFill>
+        <a:ln w="19050" cap="rnd" cmpd="sng" algn="ctr">
+          <a:solidFill>
+            <a:schemeClr val="lt1">
+              <a:hueOff val="0"/>
+              <a:satOff val="0"/>
+              <a:lumOff val="0"/>
+              <a:alphaOff val="0"/>
+            </a:schemeClr>
+          </a:solidFill>
+          <a:prstDash val="solid"/>
+        </a:ln>
+        <a:effectLst/>
+      </dsp:spPr>
+      <dsp:style>
+        <a:lnRef idx="2">
+          <a:scrgbClr r="0" g="0" b="0"/>
+        </a:lnRef>
+        <a:fillRef idx="1">
+          <a:scrgbClr r="0" g="0" b="0"/>
+        </a:fillRef>
+        <a:effectRef idx="0">
+          <a:scrgbClr r="0" g="0" b="0"/>
+        </a:effectRef>
+        <a:fontRef idx="minor">
+          <a:schemeClr val="lt1"/>
+        </a:fontRef>
+      </dsp:style>
+      <dsp:txBody>
+        <a:bodyPr spcFirstLastPara="0" vert="horz" wrap="square" lIns="19050" tIns="19050" rIns="19050" bIns="19050" numCol="1" spcCol="1270" anchor="ctr" anchorCtr="0">
+          <a:noAutofit/>
+        </a:bodyPr>
+        <a:lstStyle/>
+        <a:p>
+          <a:pPr lvl="0" algn="ctr" defTabSz="1333500">
+            <a:lnSpc>
+              <a:spcPct val="90000"/>
+            </a:lnSpc>
+            <a:spcBef>
+              <a:spcPct val="0"/>
+            </a:spcBef>
+            <a:spcAft>
+              <a:spcPct val="35000"/>
+            </a:spcAft>
+          </a:pPr>
+          <a:r>
+            <a:rPr lang="en-US" sz="3000" kern="1200" dirty="0" smtClean="0"/>
+            <a:t>MTG Server</a:t>
+          </a:r>
+          <a:endParaRPr lang="en-US" sz="3000" kern="1200" dirty="0"/>
+        </a:p>
+      </dsp:txBody>
+      <dsp:txXfrm>
+        <a:off x="27634" y="697399"/>
+        <a:ext cx="1809278" cy="877344"/>
+      </dsp:txXfrm>
+    </dsp:sp>
+    <dsp:sp modelId="{4AE31128-CCE2-4C5E-B14B-AC2FB1931328}">
+      <dsp:nvSpPr>
+        <dsp:cNvPr id="0" name=""/>
+        <dsp:cNvSpPr/>
+      </dsp:nvSpPr>
+      <dsp:spPr>
+        <a:xfrm>
+          <a:off x="1864207" y="1099157"/>
+          <a:ext cx="745547" cy="73828"/>
+        </a:xfrm>
+        <a:custGeom>
+          <a:avLst/>
+          <a:gdLst/>
+          <a:ahLst/>
+          <a:cxnLst/>
+          <a:rect l="0" t="0" r="0" b="0"/>
+          <a:pathLst>
+            <a:path>
+              <a:moveTo>
+                <a:pt x="0" y="36914"/>
+              </a:moveTo>
+              <a:lnTo>
+                <a:pt x="745547" y="36914"/>
+              </a:lnTo>
+            </a:path>
+          </a:pathLst>
+        </a:custGeom>
+        <a:noFill/>
+        <a:ln w="19050" cap="rnd" cmpd="sng" algn="ctr">
+          <a:solidFill>
+            <a:schemeClr val="accent1">
+              <a:shade val="60000"/>
+              <a:hueOff val="0"/>
+              <a:satOff val="0"/>
+              <a:lumOff val="0"/>
+              <a:alphaOff val="0"/>
+            </a:schemeClr>
+          </a:solidFill>
+          <a:prstDash val="solid"/>
+        </a:ln>
+        <a:effectLst/>
+      </dsp:spPr>
+      <dsp:style>
+        <a:lnRef idx="2">
+          <a:scrgbClr r="0" g="0" b="0"/>
+        </a:lnRef>
+        <a:fillRef idx="0">
+          <a:scrgbClr r="0" g="0" b="0"/>
+        </a:fillRef>
+        <a:effectRef idx="0">
+          <a:scrgbClr r="0" g="0" b="0"/>
+        </a:effectRef>
+        <a:fontRef idx="minor"/>
+      </dsp:style>
+      <dsp:txBody>
+        <a:bodyPr spcFirstLastPara="0" vert="horz" wrap="square" lIns="12700" tIns="0" rIns="12700" bIns="0" numCol="1" spcCol="1270" anchor="ctr" anchorCtr="0">
+          <a:noAutofit/>
+        </a:bodyPr>
+        <a:lstStyle/>
+        <a:p>
+          <a:pPr lvl="0" algn="ctr" defTabSz="222250">
+            <a:lnSpc>
+              <a:spcPct val="90000"/>
+            </a:lnSpc>
+            <a:spcBef>
+              <a:spcPct val="0"/>
+            </a:spcBef>
+            <a:spcAft>
+              <a:spcPct val="35000"/>
+            </a:spcAft>
+          </a:pPr>
+          <a:endParaRPr lang="en-US" sz="500" kern="1200"/>
+        </a:p>
+      </dsp:txBody>
+      <dsp:txXfrm>
+        <a:off x="2218342" y="1117433"/>
+        <a:ext cx="37277" cy="37277"/>
+      </dsp:txXfrm>
+    </dsp:sp>
+    <dsp:sp modelId="{40B2B726-955D-4E64-BEF3-E46FA7084B65}">
+      <dsp:nvSpPr>
+        <dsp:cNvPr id="0" name=""/>
+        <dsp:cNvSpPr/>
+      </dsp:nvSpPr>
+      <dsp:spPr>
+        <a:xfrm>
+          <a:off x="2609754" y="670104"/>
+          <a:ext cx="1863868" cy="931934"/>
+        </a:xfrm>
+        <a:prstGeom prst="roundRect">
+          <a:avLst>
+            <a:gd name="adj" fmla="val 10000"/>
+          </a:avLst>
+        </a:prstGeom>
+        <a:solidFill>
+          <a:schemeClr val="accent1">
+            <a:hueOff val="0"/>
+            <a:satOff val="0"/>
+            <a:lumOff val="0"/>
+            <a:alphaOff val="0"/>
+          </a:schemeClr>
+        </a:solidFill>
+        <a:ln w="19050" cap="rnd" cmpd="sng" algn="ctr">
+          <a:solidFill>
+            <a:schemeClr val="lt1">
+              <a:hueOff val="0"/>
+              <a:satOff val="0"/>
+              <a:lumOff val="0"/>
+              <a:alphaOff val="0"/>
+            </a:schemeClr>
+          </a:solidFill>
+          <a:prstDash val="solid"/>
+        </a:ln>
+        <a:effectLst/>
+      </dsp:spPr>
+      <dsp:style>
+        <a:lnRef idx="2">
+          <a:scrgbClr r="0" g="0" b="0"/>
+        </a:lnRef>
+        <a:fillRef idx="1">
+          <a:scrgbClr r="0" g="0" b="0"/>
+        </a:fillRef>
+        <a:effectRef idx="0">
+          <a:scrgbClr r="0" g="0" b="0"/>
+        </a:effectRef>
+        <a:fontRef idx="minor">
+          <a:schemeClr val="lt1"/>
+        </a:fontRef>
+      </dsp:style>
+      <dsp:txBody>
+        <a:bodyPr spcFirstLastPara="0" vert="horz" wrap="square" lIns="19050" tIns="19050" rIns="19050" bIns="19050" numCol="1" spcCol="1270" anchor="ctr" anchorCtr="0">
+          <a:noAutofit/>
+        </a:bodyPr>
+        <a:lstStyle/>
+        <a:p>
+          <a:pPr lvl="0" algn="ctr" defTabSz="1333500">
+            <a:lnSpc>
+              <a:spcPct val="90000"/>
+            </a:lnSpc>
+            <a:spcBef>
+              <a:spcPct val="0"/>
+            </a:spcBef>
+            <a:spcAft>
+              <a:spcPct val="35000"/>
+            </a:spcAft>
+          </a:pPr>
+          <a:r>
+            <a:rPr lang="en-US" sz="3000" kern="1200" dirty="0" smtClean="0"/>
+            <a:t>Checkout queue</a:t>
+          </a:r>
+          <a:endParaRPr lang="en-US" sz="3000" kern="1200" dirty="0"/>
+        </a:p>
+      </dsp:txBody>
+      <dsp:txXfrm>
+        <a:off x="2637049" y="697399"/>
+        <a:ext cx="1809278" cy="877344"/>
+      </dsp:txXfrm>
+    </dsp:sp>
+    <dsp:sp modelId="{4BD4F569-46C1-4784-801F-B7FD4D73E76C}">
+      <dsp:nvSpPr>
+        <dsp:cNvPr id="0" name=""/>
+        <dsp:cNvSpPr/>
+      </dsp:nvSpPr>
+      <dsp:spPr>
+        <a:xfrm>
+          <a:off x="4473622" y="1099157"/>
+          <a:ext cx="745547" cy="73828"/>
+        </a:xfrm>
+        <a:custGeom>
+          <a:avLst/>
+          <a:gdLst/>
+          <a:ahLst/>
+          <a:cxnLst/>
+          <a:rect l="0" t="0" r="0" b="0"/>
+          <a:pathLst>
+            <a:path>
+              <a:moveTo>
+                <a:pt x="0" y="36914"/>
+              </a:moveTo>
+              <a:lnTo>
+                <a:pt x="745547" y="36914"/>
+              </a:lnTo>
+            </a:path>
+          </a:pathLst>
+        </a:custGeom>
+        <a:noFill/>
+        <a:ln w="19050" cap="rnd" cmpd="sng" algn="ctr">
+          <a:solidFill>
+            <a:schemeClr val="accent1">
+              <a:shade val="80000"/>
+              <a:hueOff val="0"/>
+              <a:satOff val="0"/>
+              <a:lumOff val="0"/>
+              <a:alphaOff val="0"/>
+            </a:schemeClr>
+          </a:solidFill>
+          <a:prstDash val="solid"/>
+        </a:ln>
+        <a:effectLst/>
+      </dsp:spPr>
+      <dsp:style>
+        <a:lnRef idx="2">
+          <a:scrgbClr r="0" g="0" b="0"/>
+        </a:lnRef>
+        <a:fillRef idx="0">
+          <a:scrgbClr r="0" g="0" b="0"/>
+        </a:fillRef>
+        <a:effectRef idx="0">
+          <a:scrgbClr r="0" g="0" b="0"/>
+        </a:effectRef>
+        <a:fontRef idx="minor"/>
+      </dsp:style>
+      <dsp:txBody>
+        <a:bodyPr spcFirstLastPara="0" vert="horz" wrap="square" lIns="12700" tIns="0" rIns="12700" bIns="0" numCol="1" spcCol="1270" anchor="ctr" anchorCtr="0">
+          <a:noAutofit/>
+        </a:bodyPr>
+        <a:lstStyle/>
+        <a:p>
+          <a:pPr lvl="0" algn="ctr" defTabSz="222250">
+            <a:lnSpc>
+              <a:spcPct val="90000"/>
+            </a:lnSpc>
+            <a:spcBef>
+              <a:spcPct val="0"/>
+            </a:spcBef>
+            <a:spcAft>
+              <a:spcPct val="35000"/>
+            </a:spcAft>
+          </a:pPr>
+          <a:endParaRPr lang="en-US" sz="500" kern="1200"/>
+        </a:p>
+      </dsp:txBody>
+      <dsp:txXfrm>
+        <a:off x="4827757" y="1117433"/>
+        <a:ext cx="37277" cy="37277"/>
+      </dsp:txXfrm>
+    </dsp:sp>
+    <dsp:sp modelId="{17A60922-042F-4C03-B020-54BF33068DF3}">
+      <dsp:nvSpPr>
+        <dsp:cNvPr id="0" name=""/>
+        <dsp:cNvSpPr/>
+      </dsp:nvSpPr>
+      <dsp:spPr>
+        <a:xfrm>
+          <a:off x="5219170" y="670104"/>
+          <a:ext cx="1863868" cy="931934"/>
+        </a:xfrm>
+        <a:prstGeom prst="roundRect">
+          <a:avLst>
+            <a:gd name="adj" fmla="val 10000"/>
+          </a:avLst>
+        </a:prstGeom>
+        <a:solidFill>
+          <a:schemeClr val="accent1">
+            <a:hueOff val="0"/>
+            <a:satOff val="0"/>
+            <a:lumOff val="0"/>
+            <a:alphaOff val="0"/>
+          </a:schemeClr>
+        </a:solidFill>
+        <a:ln w="19050" cap="rnd" cmpd="sng" algn="ctr">
+          <a:solidFill>
+            <a:schemeClr val="lt1">
+              <a:hueOff val="0"/>
+              <a:satOff val="0"/>
+              <a:lumOff val="0"/>
+              <a:alphaOff val="0"/>
+            </a:schemeClr>
+          </a:solidFill>
+          <a:prstDash val="solid"/>
+        </a:ln>
+        <a:effectLst/>
+      </dsp:spPr>
+      <dsp:style>
+        <a:lnRef idx="2">
+          <a:scrgbClr r="0" g="0" b="0"/>
+        </a:lnRef>
+        <a:fillRef idx="1">
+          <a:scrgbClr r="0" g="0" b="0"/>
+        </a:fillRef>
+        <a:effectRef idx="0">
+          <a:scrgbClr r="0" g="0" b="0"/>
+        </a:effectRef>
+        <a:fontRef idx="minor">
+          <a:schemeClr val="lt1"/>
+        </a:fontRef>
+      </dsp:style>
+      <dsp:txBody>
+        <a:bodyPr spcFirstLastPara="0" vert="horz" wrap="square" lIns="19050" tIns="19050" rIns="19050" bIns="19050" numCol="1" spcCol="1270" anchor="ctr" anchorCtr="0">
+          <a:noAutofit/>
+        </a:bodyPr>
+        <a:lstStyle/>
+        <a:p>
+          <a:pPr lvl="0" algn="ctr" defTabSz="1333500">
+            <a:lnSpc>
+              <a:spcPct val="90000"/>
+            </a:lnSpc>
+            <a:spcBef>
+              <a:spcPct val="0"/>
+            </a:spcBef>
+            <a:spcAft>
+              <a:spcPct val="35000"/>
+            </a:spcAft>
+          </a:pPr>
+          <a:r>
+            <a:rPr lang="en-US" sz="3000" kern="1200" dirty="0" smtClean="0"/>
+            <a:t>Checkout Server</a:t>
+          </a:r>
+          <a:endParaRPr lang="en-US" sz="3000" kern="1200" dirty="0"/>
+        </a:p>
+      </dsp:txBody>
+      <dsp:txXfrm>
+        <a:off x="5246465" y="697399"/>
+        <a:ext cx="1809278" cy="877344"/>
+      </dsp:txXfrm>
+    </dsp:sp>
+    <dsp:sp modelId="{EC54C2B9-1130-4F49-94FC-D9785D69014C}">
+      <dsp:nvSpPr>
+        <dsp:cNvPr id="0" name=""/>
+        <dsp:cNvSpPr/>
+      </dsp:nvSpPr>
+      <dsp:spPr>
+        <a:xfrm>
+          <a:off x="7083038" y="1099157"/>
+          <a:ext cx="745547" cy="73828"/>
+        </a:xfrm>
+        <a:custGeom>
+          <a:avLst/>
+          <a:gdLst/>
+          <a:ahLst/>
+          <a:cxnLst/>
+          <a:rect l="0" t="0" r="0" b="0"/>
+          <a:pathLst>
+            <a:path>
+              <a:moveTo>
+                <a:pt x="0" y="36914"/>
+              </a:moveTo>
+              <a:lnTo>
+                <a:pt x="745547" y="36914"/>
+              </a:lnTo>
+            </a:path>
+          </a:pathLst>
+        </a:custGeom>
+        <a:noFill/>
+        <a:ln w="19050" cap="rnd" cmpd="sng" algn="ctr">
+          <a:solidFill>
+            <a:schemeClr val="accent1">
+              <a:shade val="80000"/>
+              <a:hueOff val="0"/>
+              <a:satOff val="0"/>
+              <a:lumOff val="0"/>
+              <a:alphaOff val="0"/>
+            </a:schemeClr>
+          </a:solidFill>
+          <a:prstDash val="solid"/>
+        </a:ln>
+        <a:effectLst/>
+      </dsp:spPr>
+      <dsp:style>
+        <a:lnRef idx="2">
+          <a:scrgbClr r="0" g="0" b="0"/>
+        </a:lnRef>
+        <a:fillRef idx="0">
+          <a:scrgbClr r="0" g="0" b="0"/>
+        </a:fillRef>
+        <a:effectRef idx="0">
+          <a:scrgbClr r="0" g="0" b="0"/>
+        </a:effectRef>
+        <a:fontRef idx="minor"/>
+      </dsp:style>
+      <dsp:txBody>
+        <a:bodyPr spcFirstLastPara="0" vert="horz" wrap="square" lIns="12700" tIns="0" rIns="12700" bIns="0" numCol="1" spcCol="1270" anchor="ctr" anchorCtr="0">
+          <a:noAutofit/>
+        </a:bodyPr>
+        <a:lstStyle/>
+        <a:p>
+          <a:pPr lvl="0" algn="ctr" defTabSz="222250">
+            <a:lnSpc>
+              <a:spcPct val="90000"/>
+            </a:lnSpc>
+            <a:spcBef>
+              <a:spcPct val="0"/>
+            </a:spcBef>
+            <a:spcAft>
+              <a:spcPct val="35000"/>
+            </a:spcAft>
+          </a:pPr>
+          <a:endParaRPr lang="en-US" sz="500" kern="1200"/>
+        </a:p>
+      </dsp:txBody>
+      <dsp:txXfrm>
+        <a:off x="7437173" y="1117433"/>
+        <a:ext cx="37277" cy="37277"/>
+      </dsp:txXfrm>
+    </dsp:sp>
+    <dsp:sp modelId="{1C6F0FB2-107F-4E80-B0C6-7D85D179FEB7}">
+      <dsp:nvSpPr>
+        <dsp:cNvPr id="0" name=""/>
+        <dsp:cNvSpPr/>
+      </dsp:nvSpPr>
+      <dsp:spPr>
+        <a:xfrm>
+          <a:off x="7828585" y="670104"/>
+          <a:ext cx="1863868" cy="931934"/>
+        </a:xfrm>
+        <a:prstGeom prst="roundRect">
+          <a:avLst>
+            <a:gd name="adj" fmla="val 10000"/>
+          </a:avLst>
+        </a:prstGeom>
+        <a:solidFill>
+          <a:schemeClr val="accent1">
+            <a:hueOff val="0"/>
+            <a:satOff val="0"/>
+            <a:lumOff val="0"/>
+            <a:alphaOff val="0"/>
+          </a:schemeClr>
+        </a:solidFill>
+        <a:ln w="19050" cap="rnd" cmpd="sng" algn="ctr">
+          <a:solidFill>
+            <a:schemeClr val="lt1">
+              <a:hueOff val="0"/>
+              <a:satOff val="0"/>
+              <a:lumOff val="0"/>
+              <a:alphaOff val="0"/>
+            </a:schemeClr>
+          </a:solidFill>
+          <a:prstDash val="solid"/>
+        </a:ln>
+        <a:effectLst/>
+      </dsp:spPr>
+      <dsp:style>
+        <a:lnRef idx="2">
+          <a:scrgbClr r="0" g="0" b="0"/>
+        </a:lnRef>
+        <a:fillRef idx="1">
+          <a:scrgbClr r="0" g="0" b="0"/>
+        </a:fillRef>
+        <a:effectRef idx="0">
+          <a:scrgbClr r="0" g="0" b="0"/>
+        </a:effectRef>
+        <a:fontRef idx="minor">
+          <a:schemeClr val="lt1"/>
+        </a:fontRef>
+      </dsp:style>
+      <dsp:txBody>
+        <a:bodyPr spcFirstLastPara="0" vert="horz" wrap="square" lIns="19050" tIns="19050" rIns="19050" bIns="19050" numCol="1" spcCol="1270" anchor="ctr" anchorCtr="0">
+          <a:noAutofit/>
+        </a:bodyPr>
+        <a:lstStyle/>
+        <a:p>
+          <a:pPr lvl="0" algn="ctr" defTabSz="1333500">
+            <a:lnSpc>
+              <a:spcPct val="90000"/>
+            </a:lnSpc>
+            <a:spcBef>
+              <a:spcPct val="0"/>
+            </a:spcBef>
+            <a:spcAft>
+              <a:spcPct val="35000"/>
+            </a:spcAft>
+          </a:pPr>
+          <a:r>
+            <a:rPr lang="en-US" sz="3000" kern="1200" dirty="0" smtClean="0"/>
+            <a:t>Customer exit</a:t>
+          </a:r>
+          <a:endParaRPr lang="en-US" sz="3000" kern="1200" dirty="0"/>
+        </a:p>
+      </dsp:txBody>
+      <dsp:txXfrm>
+        <a:off x="7855880" y="697399"/>
+        <a:ext cx="1809278" cy="877344"/>
+      </dsp:txXfrm>
+    </dsp:sp>
   </dsp:spTree>
 </dsp:drawing>
 </file>
@@ -5932,7 +7198,7 @@
           <a:p>
             <a:fld id="{0AD700AD-284F-4CBF-9DC7-EBED3AE09D54}" type="datetimeFigureOut">
               <a:rPr lang="en-US" smtClean="0"/>
-              <a:t>12/1/2014</a:t>
+              <a:t>12/1/14</a:t>
             </a:fld>
             <a:endParaRPr lang="en-US"/>
           </a:p>
@@ -6183,7 +7449,7 @@
           <a:p>
             <a:fld id="{0AD700AD-284F-4CBF-9DC7-EBED3AE09D54}" type="datetimeFigureOut">
               <a:rPr lang="en-US" smtClean="0"/>
-              <a:t>12/1/2014</a:t>
+              <a:t>12/1/14</a:t>
             </a:fld>
             <a:endParaRPr lang="en-US"/>
           </a:p>
@@ -6497,7 +7763,7 @@
           <a:p>
             <a:fld id="{0AD700AD-284F-4CBF-9DC7-EBED3AE09D54}" type="datetimeFigureOut">
               <a:rPr lang="en-US" smtClean="0"/>
-              <a:t>12/1/2014</a:t>
+              <a:t>12/1/14</a:t>
             </a:fld>
             <a:endParaRPr lang="en-US"/>
           </a:p>
@@ -6824,7 +8090,7 @@
           <a:p>
             <a:fld id="{0AD700AD-284F-4CBF-9DC7-EBED3AE09D54}" type="datetimeFigureOut">
               <a:rPr lang="en-US" smtClean="0"/>
-              <a:t>12/1/2014</a:t>
+              <a:t>12/1/14</a:t>
             </a:fld>
             <a:endParaRPr lang="en-US"/>
           </a:p>
@@ -7138,7 +8404,7 @@
           <a:p>
             <a:fld id="{0AD700AD-284F-4CBF-9DC7-EBED3AE09D54}" type="datetimeFigureOut">
               <a:rPr lang="en-US" smtClean="0"/>
-              <a:t>12/1/2014</a:t>
+              <a:t>12/1/14</a:t>
             </a:fld>
             <a:endParaRPr lang="en-US"/>
           </a:p>
@@ -7525,7 +8791,7 @@
           <a:p>
             <a:fld id="{0AD700AD-284F-4CBF-9DC7-EBED3AE09D54}" type="datetimeFigureOut">
               <a:rPr lang="en-US" smtClean="0"/>
-              <a:t>12/1/2014</a:t>
+              <a:t>12/1/14</a:t>
             </a:fld>
             <a:endParaRPr lang="en-US"/>
           </a:p>
@@ -7695,7 +8961,7 @@
           <a:p>
             <a:fld id="{0AD700AD-284F-4CBF-9DC7-EBED3AE09D54}" type="datetimeFigureOut">
               <a:rPr lang="en-US" smtClean="0"/>
-              <a:t>12/1/2014</a:t>
+              <a:t>12/1/14</a:t>
             </a:fld>
             <a:endParaRPr lang="en-US"/>
           </a:p>
@@ -7875,7 +9141,7 @@
           <a:p>
             <a:fld id="{0AD700AD-284F-4CBF-9DC7-EBED3AE09D54}" type="datetimeFigureOut">
               <a:rPr lang="en-US" smtClean="0"/>
-              <a:t>12/1/2014</a:t>
+              <a:t>12/1/14</a:t>
             </a:fld>
             <a:endParaRPr lang="en-US"/>
           </a:p>
@@ -8051,7 +9317,7 @@
           <a:p>
             <a:fld id="{0AD700AD-284F-4CBF-9DC7-EBED3AE09D54}" type="datetimeFigureOut">
               <a:rPr lang="en-US" smtClean="0"/>
-              <a:t>12/1/2014</a:t>
+              <a:t>12/1/14</a:t>
             </a:fld>
             <a:endParaRPr lang="en-US"/>
           </a:p>
@@ -8298,7 +9564,7 @@
           <a:p>
             <a:fld id="{0AD700AD-284F-4CBF-9DC7-EBED3AE09D54}" type="datetimeFigureOut">
               <a:rPr lang="en-US" smtClean="0"/>
-              <a:t>12/1/2014</a:t>
+              <a:t>12/1/14</a:t>
             </a:fld>
             <a:endParaRPr lang="en-US"/>
           </a:p>
@@ -8530,7 +9796,7 @@
           <a:p>
             <a:fld id="{0AD700AD-284F-4CBF-9DC7-EBED3AE09D54}" type="datetimeFigureOut">
               <a:rPr lang="en-US" smtClean="0"/>
-              <a:t>12/1/2014</a:t>
+              <a:t>12/1/14</a:t>
             </a:fld>
             <a:endParaRPr lang="en-US"/>
           </a:p>
@@ -8904,7 +10170,7 @@
           <a:p>
             <a:fld id="{0AD700AD-284F-4CBF-9DC7-EBED3AE09D54}" type="datetimeFigureOut">
               <a:rPr lang="en-US" smtClean="0"/>
-              <a:t>12/1/2014</a:t>
+              <a:t>12/1/14</a:t>
             </a:fld>
             <a:endParaRPr lang="en-US"/>
           </a:p>
@@ -9027,7 +10293,7 @@
           <a:p>
             <a:fld id="{0AD700AD-284F-4CBF-9DC7-EBED3AE09D54}" type="datetimeFigureOut">
               <a:rPr lang="en-US" smtClean="0"/>
-              <a:t>12/1/2014</a:t>
+              <a:t>12/1/14</a:t>
             </a:fld>
             <a:endParaRPr lang="en-US"/>
           </a:p>
@@ -9122,7 +10388,7 @@
           <a:p>
             <a:fld id="{0AD700AD-284F-4CBF-9DC7-EBED3AE09D54}" type="datetimeFigureOut">
               <a:rPr lang="en-US" smtClean="0"/>
-              <a:t>12/1/2014</a:t>
+              <a:t>12/1/14</a:t>
             </a:fld>
             <a:endParaRPr lang="en-US"/>
           </a:p>
@@ -9377,7 +10643,7 @@
           <a:p>
             <a:fld id="{0AD700AD-284F-4CBF-9DC7-EBED3AE09D54}" type="datetimeFigureOut">
               <a:rPr lang="en-US" smtClean="0"/>
-              <a:t>12/1/2014</a:t>
+              <a:t>12/1/14</a:t>
             </a:fld>
             <a:endParaRPr lang="en-US"/>
           </a:p>
@@ -9640,7 +10906,7 @@
           <a:p>
             <a:fld id="{0AD700AD-284F-4CBF-9DC7-EBED3AE09D54}" type="datetimeFigureOut">
               <a:rPr lang="en-US" smtClean="0"/>
-              <a:t>12/1/2014</a:t>
+              <a:t>12/1/14</a:t>
             </a:fld>
             <a:endParaRPr lang="en-US"/>
           </a:p>
@@ -10385,7 +11651,7 @@
           <a:p>
             <a:fld id="{0AD700AD-284F-4CBF-9DC7-EBED3AE09D54}" type="datetimeFigureOut">
               <a:rPr lang="en-US" smtClean="0"/>
-              <a:t>12/1/2014</a:t>
+              <a:t>12/1/14</a:t>
             </a:fld>
             <a:endParaRPr lang="en-US"/>
           </a:p>
@@ -10999,7 +12265,7 @@
   <p:timing>
     <p:tnLst>
       <p:par>
-        <p:cTn id="1" dur="indefinite" restart="never" nodeType="tmRoot"/>
+        <p:cTn xmlns:p14="http://schemas.microsoft.com/office/powerpoint/2010/main" id="1" dur="indefinite" restart="never" nodeType="tmRoot"/>
       </p:par>
     </p:tnLst>
   </p:timing>
@@ -11007,6 +12273,290 @@
 </file>
 
 <file path=ppt/slides/slide10.xml><?xml version="1.0" encoding="utf-8"?>
+<p:sld xmlns:a="http://schemas.openxmlformats.org/drawingml/2006/main" xmlns:r="http://schemas.openxmlformats.org/officeDocument/2006/relationships" xmlns:p="http://schemas.openxmlformats.org/presentationml/2006/main">
+  <p:cSld>
+    <p:spTree>
+      <p:nvGrpSpPr>
+        <p:cNvPr id="1" name=""/>
+        <p:cNvGrpSpPr/>
+        <p:nvPr/>
+      </p:nvGrpSpPr>
+      <p:grpSpPr>
+        <a:xfrm>
+          <a:off x="0" y="0"/>
+          <a:ext cx="0" cy="0"/>
+          <a:chOff x="0" y="0"/>
+          <a:chExt cx="0" cy="0"/>
+        </a:xfrm>
+      </p:grpSpPr>
+      <p:sp>
+        <p:nvSpPr>
+          <p:cNvPr id="2" name="Title 1"/>
+          <p:cNvSpPr>
+            <a:spLocks noGrp="1"/>
+          </p:cNvSpPr>
+          <p:nvPr>
+            <p:ph type="title"/>
+          </p:nvPr>
+        </p:nvSpPr>
+        <p:spPr/>
+        <p:txBody>
+          <a:bodyPr/>
+          <a:lstStyle/>
+          <a:p>
+            <a:r>
+              <a:rPr lang="en-US" dirty="0" smtClean="0"/>
+              <a:t>Verify Assumptions, Finding Best-Fit (Data Analysis)</a:t>
+            </a:r>
+            <a:endParaRPr lang="en-US" dirty="0"/>
+          </a:p>
+        </p:txBody>
+      </p:sp>
+      <p:sp>
+        <p:nvSpPr>
+          <p:cNvPr id="3" name="Content Placeholder 2"/>
+          <p:cNvSpPr>
+            <a:spLocks noGrp="1"/>
+          </p:cNvSpPr>
+          <p:nvPr>
+            <p:ph idx="1"/>
+          </p:nvPr>
+        </p:nvSpPr>
+        <p:spPr>
+          <a:xfrm>
+            <a:off x="677334" y="2160589"/>
+            <a:ext cx="8596668" cy="4337938"/>
+          </a:xfrm>
+        </p:spPr>
+        <p:txBody>
+          <a:bodyPr>
+            <a:normAutofit/>
+          </a:bodyPr>
+          <a:lstStyle/>
+          <a:p>
+            <a:r>
+              <a:rPr lang="en-US" dirty="0"/>
+              <a:t>We can verify that the arrival process is Poisson via Kolmogorov-Smirnov, but more than that requires guesswork: </a:t>
+            </a:r>
+            <a:endParaRPr lang="en-US" dirty="0" smtClean="0"/>
+          </a:p>
+          <a:p>
+            <a:pPr lvl="1"/>
+            <a:r>
+              <a:rPr lang="en-US" dirty="0"/>
+              <a:t>T</a:t>
+            </a:r>
+            <a:r>
+              <a:rPr lang="en-US" dirty="0" smtClean="0"/>
+              <a:t>ry </a:t>
+            </a:r>
+            <a:r>
+              <a:rPr lang="en-US" dirty="0"/>
+              <a:t>various parameters for distributions in the internal parts, see what fits best with </a:t>
+            </a:r>
+            <a:r>
+              <a:rPr lang="en-US" dirty="0" smtClean="0"/>
+              <a:t>data…</a:t>
+            </a:r>
+            <a:endParaRPr lang="en-US" dirty="0"/>
+          </a:p>
+          <a:p>
+            <a:pPr lvl="1"/>
+            <a:r>
+              <a:rPr lang="en-US" dirty="0" smtClean="0"/>
+              <a:t>Much harder to confirm our assumptions about the types of distribution: We used common sense, but in practice things might be different</a:t>
+            </a:r>
+          </a:p>
+          <a:p>
+            <a:r>
+              <a:rPr lang="en-US" dirty="0" smtClean="0"/>
+              <a:t>So we can try exactly that.</a:t>
+            </a:r>
+          </a:p>
+          <a:p>
+            <a:pPr lvl="1"/>
+            <a:r>
+              <a:rPr lang="en-US" dirty="0" smtClean="0"/>
+              <a:t>Find parameters where the in/out distributions best match our collected data</a:t>
+            </a:r>
+          </a:p>
+          <a:p>
+            <a:pPr lvl="1"/>
+            <a:r>
+              <a:rPr lang="en-US" dirty="0"/>
+              <a:t>E</a:t>
+            </a:r>
+            <a:r>
+              <a:rPr lang="en-US" dirty="0" smtClean="0"/>
+              <a:t>ven the best-fit model we create might fail!</a:t>
+            </a:r>
+          </a:p>
+          <a:p>
+            <a:pPr lvl="1"/>
+            <a:r>
+              <a:rPr lang="en-US" dirty="0"/>
+              <a:t>See how well the best-fit </a:t>
+            </a:r>
+            <a:r>
+              <a:rPr lang="en-US" dirty="0" smtClean="0"/>
+              <a:t>model </a:t>
+            </a:r>
+            <a:r>
+              <a:rPr lang="en-US" dirty="0"/>
+              <a:t>fits </a:t>
+            </a:r>
+            <a:r>
+              <a:rPr lang="en-US" dirty="0" smtClean="0"/>
+              <a:t>the data (</a:t>
+            </a:r>
+            <a:r>
+              <a:rPr lang="en-US" dirty="0"/>
+              <a:t>by K-S </a:t>
+            </a:r>
+            <a:r>
+              <a:rPr lang="en-US" dirty="0" smtClean="0"/>
+              <a:t>comparison of departure times)</a:t>
+            </a:r>
+          </a:p>
+          <a:p>
+            <a:pPr lvl="2"/>
+            <a:r>
+              <a:rPr lang="en-US" dirty="0" smtClean="0"/>
+              <a:t>Because of the ordering issue (reality’s not FIFO) we can’t compare times in system directly</a:t>
+            </a:r>
+          </a:p>
+        </p:txBody>
+      </p:sp>
+    </p:spTree>
+    <p:extLst>
+      <p:ext uri="{BB962C8B-B14F-4D97-AF65-F5344CB8AC3E}">
+        <p14:creationId xmlns:p14="http://schemas.microsoft.com/office/powerpoint/2010/main" val="803505307"/>
+      </p:ext>
+    </p:extLst>
+  </p:cSld>
+  <p:clrMapOvr>
+    <a:masterClrMapping/>
+  </p:clrMapOvr>
+</p:sld>
+</file>
+
+<file path=ppt/slides/slide11.xml><?xml version="1.0" encoding="utf-8"?>
+<p:sld xmlns:a="http://schemas.openxmlformats.org/drawingml/2006/main" xmlns:r="http://schemas.openxmlformats.org/officeDocument/2006/relationships" xmlns:p="http://schemas.openxmlformats.org/presentationml/2006/main">
+  <p:cSld>
+    <p:spTree>
+      <p:nvGrpSpPr>
+        <p:cNvPr id="1" name=""/>
+        <p:cNvGrpSpPr/>
+        <p:nvPr/>
+      </p:nvGrpSpPr>
+      <p:grpSpPr>
+        <a:xfrm>
+          <a:off x="0" y="0"/>
+          <a:ext cx="0" cy="0"/>
+          <a:chOff x="0" y="0"/>
+          <a:chExt cx="0" cy="0"/>
+        </a:xfrm>
+      </p:grpSpPr>
+      <p:sp>
+        <p:nvSpPr>
+          <p:cNvPr id="2" name="Title 1"/>
+          <p:cNvSpPr>
+            <a:spLocks noGrp="1"/>
+          </p:cNvSpPr>
+          <p:nvPr>
+            <p:ph type="title"/>
+          </p:nvPr>
+        </p:nvSpPr>
+        <p:spPr/>
+        <p:txBody>
+          <a:bodyPr/>
+          <a:lstStyle/>
+          <a:p>
+            <a:pPr algn="ctr"/>
+            <a:r>
+              <a:rPr lang="en-US" dirty="0" smtClean="0"/>
+              <a:t>Discussion Points</a:t>
+            </a:r>
+            <a:endParaRPr lang="en-US" dirty="0"/>
+          </a:p>
+        </p:txBody>
+      </p:sp>
+      <p:sp>
+        <p:nvSpPr>
+          <p:cNvPr id="3" name="Content Placeholder 2"/>
+          <p:cNvSpPr>
+            <a:spLocks noGrp="1"/>
+          </p:cNvSpPr>
+          <p:nvPr>
+            <p:ph idx="1"/>
+          </p:nvPr>
+        </p:nvSpPr>
+        <p:spPr/>
+        <p:txBody>
+          <a:bodyPr/>
+          <a:lstStyle/>
+          <a:p>
+            <a:r>
+              <a:rPr lang="en-US" dirty="0" smtClean="0"/>
+              <a:t>Does limiting customers to just one service area limit the results of the experiment?</a:t>
+            </a:r>
+          </a:p>
+          <a:p>
+            <a:r>
+              <a:rPr lang="en-US" dirty="0" smtClean="0"/>
+              <a:t>We would have liked to have modeled the different areas in Quick Zone and Market To-Go to better illustrate the actual environment</a:t>
+            </a:r>
+          </a:p>
+          <a:p>
+            <a:r>
+              <a:rPr lang="en-US" dirty="0" smtClean="0"/>
+              <a:t>Salad station, cold food area, sushi stand</a:t>
+            </a:r>
+          </a:p>
+          <a:p>
+            <a:r>
+              <a:rPr lang="en-US" dirty="0" smtClean="0"/>
+              <a:t>Collect data the better reflects the different days wither higher traffic</a:t>
+            </a:r>
+          </a:p>
+          <a:p>
+            <a:r>
+              <a:rPr lang="en-US" dirty="0" smtClean="0"/>
+              <a:t>Finals week where students are more likely to eat out </a:t>
+            </a:r>
+          </a:p>
+          <a:p>
+            <a:r>
+              <a:rPr lang="en-US" dirty="0" smtClean="0"/>
+              <a:t>Weekend nights where students need party supplies</a:t>
+            </a:r>
+          </a:p>
+          <a:p>
+            <a:endParaRPr lang="en-US" dirty="0"/>
+          </a:p>
+        </p:txBody>
+      </p:sp>
+    </p:spTree>
+    <p:extLst>
+      <p:ext uri="{BB962C8B-B14F-4D97-AF65-F5344CB8AC3E}">
+        <p14:creationId xmlns:p14="http://schemas.microsoft.com/office/powerpoint/2010/main" val="2521795236"/>
+      </p:ext>
+    </p:extLst>
+  </p:cSld>
+  <p:clrMapOvr>
+    <a:masterClrMapping/>
+  </p:clrMapOvr>
+  <p:timing>
+    <p:tnLst>
+      <p:par>
+        <p:cTn xmlns:p14="http://schemas.microsoft.com/office/powerpoint/2010/main" id="1" dur="indefinite" restart="never" nodeType="tmRoot"/>
+      </p:par>
+    </p:tnLst>
+  </p:timing>
+</p:sld>
+</file>
+
+<file path=ppt/slides/slide12.xml><?xml version="1.0" encoding="utf-8"?>
 <p:sld xmlns:a="http://schemas.openxmlformats.org/drawingml/2006/main" xmlns:r="http://schemas.openxmlformats.org/officeDocument/2006/relationships" xmlns:p="http://schemas.openxmlformats.org/presentationml/2006/main">
   <p:cSld>
     <p:spTree>
@@ -11119,7 +12669,7 @@
   <p:timing>
     <p:tnLst>
       <p:par>
-        <p:cTn id="1" dur="indefinite" restart="never" nodeType="tmRoot"/>
+        <p:cTn xmlns:p14="http://schemas.microsoft.com/office/powerpoint/2010/main" id="1" dur="indefinite" restart="never" nodeType="tmRoot"/>
       </p:par>
     </p:tnLst>
   </p:timing>
@@ -11244,7 +12794,7 @@
   <p:timing>
     <p:tnLst>
       <p:par>
-        <p:cTn id="1" dur="indefinite" restart="never" nodeType="tmRoot"/>
+        <p:cTn xmlns:p14="http://schemas.microsoft.com/office/powerpoint/2010/main" id="1" dur="indefinite" restart="never" nodeType="tmRoot"/>
       </p:par>
     </p:tnLst>
   </p:timing>
@@ -11369,7 +12919,7 @@
   <p:timing>
     <p:tnLst>
       <p:par>
-        <p:cTn id="1" dur="indefinite" restart="never" nodeType="tmRoot"/>
+        <p:cTn xmlns:p14="http://schemas.microsoft.com/office/powerpoint/2010/main" id="1" dur="indefinite" restart="never" nodeType="tmRoot"/>
       </p:par>
     </p:tnLst>
   </p:timing>
@@ -11574,7 +13124,7 @@
   <p:timing>
     <p:tnLst>
       <p:par>
-        <p:cTn id="1" dur="indefinite" restart="never" nodeType="tmRoot"/>
+        <p:cTn xmlns:p14="http://schemas.microsoft.com/office/powerpoint/2010/main" id="1" dur="indefinite" restart="never" nodeType="tmRoot"/>
       </p:par>
     </p:tnLst>
   </p:timing>
@@ -11771,7 +13321,7 @@
   <p:timing>
     <p:tnLst>
       <p:par>
-        <p:cTn id="1" dur="indefinite" restart="never" nodeType="tmRoot"/>
+        <p:cTn xmlns:p14="http://schemas.microsoft.com/office/powerpoint/2010/main" id="1" dur="indefinite" restart="never" nodeType="tmRoot"/>
       </p:par>
     </p:tnLst>
   </p:timing>
@@ -11897,7 +13447,7 @@
   <p:timing>
     <p:tnLst>
       <p:par>
-        <p:cTn id="1" dur="indefinite" restart="never" nodeType="tmRoot"/>
+        <p:cTn xmlns:p14="http://schemas.microsoft.com/office/powerpoint/2010/main" id="1" dur="indefinite" restart="never" nodeType="tmRoot"/>
       </p:par>
     </p:tnLst>
   </p:timing>
@@ -12006,7 +13556,7 @@
   <p:timing>
     <p:tnLst>
       <p:par>
-        <p:cTn id="1" dur="indefinite" restart="never" nodeType="tmRoot"/>
+        <p:cTn xmlns:p14="http://schemas.microsoft.com/office/powerpoint/2010/main" id="1" dur="indefinite" restart="never" nodeType="tmRoot"/>
       </p:par>
     </p:tnLst>
   </p:timing>
@@ -12546,7 +14096,7 @@
   <p:timing>
     <p:tnLst>
       <p:par>
-        <p:cTn id="1" dur="indefinite" restart="never" nodeType="tmRoot"/>
+        <p:cTn xmlns:p14="http://schemas.microsoft.com/office/powerpoint/2010/main" id="1" dur="indefinite" restart="never" nodeType="tmRoot"/>
       </p:par>
     </p:tnLst>
   </p:timing>
@@ -12585,10 +14135,9 @@
           <a:bodyPr/>
           <a:lstStyle/>
           <a:p>
-            <a:pPr algn="ctr"/>
             <a:r>
               <a:rPr lang="en-US" dirty="0" smtClean="0"/>
-              <a:t>Discussion Points</a:t>
+              <a:t>Verify Assumptions, Finding Best-Fit (Data Analysis)</a:t>
             </a:r>
             <a:endParaRPr lang="en-US" dirty="0"/>
           </a:p>
@@ -12606,66 +14155,81 @@
         </p:nvSpPr>
         <p:spPr/>
         <p:txBody>
-          <a:bodyPr/>
+          <a:bodyPr>
+            <a:normAutofit/>
+          </a:bodyPr>
           <a:lstStyle/>
           <a:p>
             <a:r>
               <a:rPr lang="en-US" dirty="0" smtClean="0"/>
-              <a:t>Does limiting customers to just one service area limit the results of the experiment?</a:t>
+              <a:t>What we have measured:</a:t>
             </a:r>
           </a:p>
           <a:p>
             <a:r>
               <a:rPr lang="en-US" dirty="0" smtClean="0"/>
-              <a:t>We would have liked to have modeled the different areas in Quick Zone and Market To-Go to better illustrate the actual environment</a:t>
+              <a:t>Customer Arrival Times</a:t>
             </a:r>
           </a:p>
           <a:p>
             <a:r>
               <a:rPr lang="en-US" dirty="0" smtClean="0"/>
-              <a:t>Salad station, cold food area, sushi stand</a:t>
+              <a:t>Customer Exit Times</a:t>
             </a:r>
           </a:p>
           <a:p>
             <a:r>
               <a:rPr lang="en-US" dirty="0" smtClean="0"/>
-              <a:t>Collect data the better reflects the different days wither higher traffic</a:t>
-            </a:r>
+              <a:t>Which section customers use</a:t>
+            </a:r>
+          </a:p>
+          <a:p>
+            <a:endParaRPr lang="en-US" dirty="0"/>
           </a:p>
           <a:p>
             <a:r>
               <a:rPr lang="en-US" dirty="0" smtClean="0"/>
-              <a:t>Finals week where students are more likely to eat out </a:t>
-            </a:r>
-          </a:p>
-          <a:p>
+              <a:t>This masks internal workings:</a:t>
+            </a:r>
+          </a:p>
+          <a:p>
+            <a:pPr lvl="1"/>
             <a:r>
               <a:rPr lang="en-US" dirty="0" smtClean="0"/>
-              <a:t>Weekend nights where students need party supplies</a:t>
-            </a:r>
-          </a:p>
-          <a:p>
-            <a:endParaRPr lang="en-US" dirty="0"/>
+              <a:t>Time spent in Market To Go queue/ in </a:t>
+            </a:r>
+            <a:r>
+              <a:rPr lang="en-US" dirty="0" err="1" smtClean="0"/>
+              <a:t>Quickzone</a:t>
+            </a:r>
+            <a:r>
+              <a:rPr lang="en-US" dirty="0"/>
+              <a:t> </a:t>
+            </a:r>
+            <a:r>
+              <a:rPr lang="en-US" dirty="0" smtClean="0"/>
+              <a:t>browsing</a:t>
+            </a:r>
+          </a:p>
+          <a:p>
+            <a:pPr lvl="1"/>
+            <a:r>
+              <a:rPr lang="en-US" dirty="0" smtClean="0"/>
+              <a:t>cases where FIFO is violated (happens with some frequency in the simulation), etc.</a:t>
+            </a:r>
           </a:p>
         </p:txBody>
       </p:sp>
     </p:spTree>
     <p:extLst>
       <p:ext uri="{BB962C8B-B14F-4D97-AF65-F5344CB8AC3E}">
-        <p14:creationId xmlns:p14="http://schemas.microsoft.com/office/powerpoint/2010/main" val="2521795236"/>
+        <p14:creationId xmlns:p14="http://schemas.microsoft.com/office/powerpoint/2010/main" val="3515584265"/>
       </p:ext>
     </p:extLst>
   </p:cSld>
   <p:clrMapOvr>
     <a:masterClrMapping/>
   </p:clrMapOvr>
-  <p:timing>
-    <p:tnLst>
-      <p:par>
-        <p:cTn id="1" dur="indefinite" restart="never" nodeType="tmRoot"/>
-      </p:par>
-    </p:tnLst>
-  </p:timing>
 </p:sld>
 </file>
 
@@ -12712,7 +14276,7 @@
     </a:clrScheme>
     <a:fontScheme name="Facet">
       <a:majorFont>
-        <a:latin typeface="Trebuchet MS" panose="020B0603020202020204"/>
+        <a:latin typeface="Trebuchet MS"/>
         <a:ea typeface=""/>
         <a:cs typeface=""/>
         <a:font script="Jpan" typeface="メイリオ"/>
@@ -12747,7 +14311,7 @@
         <a:font script="Geor" typeface="Sylfaen"/>
       </a:majorFont>
       <a:minorFont>
-        <a:latin typeface="Trebuchet MS" panose="020B0603020202020204"/>
+        <a:latin typeface="Trebuchet MS"/>
         <a:ea typeface=""/>
         <a:cs typeface=""/>
         <a:font script="Jpan" typeface="メイリオ"/>
@@ -12920,7 +14484,7 @@
   <a:extraClrSchemeLst/>
   <a:extLst>
     <a:ext uri="{05A4C25C-085E-4340-85A3-A5531E510DB2}">
-      <thm15:themeFamily xmlns:thm15="http://schemas.microsoft.com/office/thememl/2012/main" name="Facet" id="{C0C680CD-088A-49FC-A102-D699147F32B2}" vid="{8C59B386-999D-4CB6-B907-9F3997C027CC}"/>
+      <thm15:themeFamily xmlns:thm15="http://schemas.microsoft.com/office/thememl/2012/main" xmlns="" name="Facet" id="{C0C680CD-088A-49FC-A102-D699147F32B2}" vid="{8C59B386-999D-4CB6-B907-9F3997C027CC}"/>
     </a:ext>
   </a:extLst>
 </a:theme>

</xml_diff>